<commit_message>
Deploying to gh-pages from @ Adama-WADE/Tutorial-Translation@9da311044a60960d9daba92dbb660d5fba12f3cd 🚀
</commit_message>
<xml_diff>
--- a/README.pptx
+++ b/README.pptx
@@ -30,35 +30,9 @@
     <p:sldId id="278" r:id="rId24"/>
     <p:sldId id="279" r:id="rId25"/>
     <p:sldId id="280" r:id="rId26"/>
-    <p:sldId id="281" r:id="rId27"/>
-    <p:sldId id="282" r:id="rId28"/>
-    <p:sldId id="283" r:id="rId29"/>
-    <p:sldId id="284" r:id="rId30"/>
-    <p:sldId id="285" r:id="rId31"/>
-    <p:sldId id="286" r:id="rId32"/>
-    <p:sldId id="287" r:id="rId33"/>
-    <p:sldId id="288" r:id="rId34"/>
-    <p:sldId id="289" r:id="rId35"/>
-    <p:sldId id="290" r:id="rId36"/>
-    <p:sldId id="291" r:id="rId37"/>
-    <p:sldId id="292" r:id="rId38"/>
-    <p:sldId id="293" r:id="rId39"/>
-    <p:sldId id="294" r:id="rId40"/>
-    <p:sldId id="295" r:id="rId41"/>
-    <p:sldId id="296" r:id="rId42"/>
-    <p:sldId id="297" r:id="rId43"/>
-    <p:sldId id="298" r:id="rId44"/>
-    <p:sldId id="299" r:id="rId45"/>
-    <p:sldId id="300" r:id="rId46"/>
-    <p:sldId id="301" r:id="rId47"/>
-    <p:sldId id="302" r:id="rId48"/>
-    <p:sldId id="303" r:id="rId49"/>
-    <p:sldId id="304" r:id="rId50"/>
-    <p:sldId id="305" r:id="rId51"/>
-    <p:sldId id="306" r:id="rId52"/>
   </p:sldIdLst>
   <p:notesMasterIdLst>
-    <p:notesMasterId r:id="rId53"/>
+    <p:notesMasterId r:id="rId27"/>
   </p:notesMasterIdLst>
   <p:sldSz cx="12192000" cy="6858000"/>
   <p:notesSz cx="6858000" cy="12192000"/>
@@ -2090,7 +2064,7 @@
 </p:notes>
 </file>
 
-<file path=ppt/notesSlides/notesSlide26.xml><?xml version="1.0" encoding="utf-8"?>
+<file path=ppt/notesSlides/notesSlide3.xml><?xml version="1.0" encoding="utf-8"?>
 <p:notes xmlns:a="http://schemas.openxmlformats.org/drawingml/2006/main" xmlns:r="http://schemas.openxmlformats.org/officeDocument/2006/relationships" xmlns:p="http://schemas.openxmlformats.org/presentationml/2006/main">
   <p:cSld>
     <p:spTree>
@@ -2159,7 +2133,7 @@
           <a:p>
             <a:fld id="{F7021451-1387-4CA6-816F-3879F97B5CBC}" type="slidenum">
               <a:rPr lang="en-US"/>
-              <a:t>26</a:t>
+              <a:t>3</a:t>
             </a:fld>
             <a:endParaRPr lang="en-US"/>
           </a:p>
@@ -2178,7 +2152,7 @@
 </p:notes>
 </file>
 
-<file path=ppt/notesSlides/notesSlide27.xml><?xml version="1.0" encoding="utf-8"?>
+<file path=ppt/notesSlides/notesSlide4.xml><?xml version="1.0" encoding="utf-8"?>
 <p:notes xmlns:a="http://schemas.openxmlformats.org/drawingml/2006/main" xmlns:r="http://schemas.openxmlformats.org/officeDocument/2006/relationships" xmlns:p="http://schemas.openxmlformats.org/presentationml/2006/main">
   <p:cSld>
     <p:spTree>
@@ -2247,7 +2221,7 @@
           <a:p>
             <a:fld id="{F7021451-1387-4CA6-816F-3879F97B5CBC}" type="slidenum">
               <a:rPr lang="en-US"/>
-              <a:t>27</a:t>
+              <a:t>4</a:t>
             </a:fld>
             <a:endParaRPr lang="en-US"/>
           </a:p>
@@ -2266,7 +2240,7 @@
 </p:notes>
 </file>
 
-<file path=ppt/notesSlides/notesSlide28.xml><?xml version="1.0" encoding="utf-8"?>
+<file path=ppt/notesSlides/notesSlide5.xml><?xml version="1.0" encoding="utf-8"?>
 <p:notes xmlns:a="http://schemas.openxmlformats.org/drawingml/2006/main" xmlns:r="http://schemas.openxmlformats.org/officeDocument/2006/relationships" xmlns:p="http://schemas.openxmlformats.org/presentationml/2006/main">
   <p:cSld>
     <p:spTree>
@@ -2335,2295 +2309,7 @@
           <a:p>
             <a:fld id="{F7021451-1387-4CA6-816F-3879F97B5CBC}" type="slidenum">
               <a:rPr lang="en-US"/>
-              <a:t>28</a:t>
-            </a:fld>
-            <a:endParaRPr lang="en-US"/>
-          </a:p>
-        </p:txBody>
-      </p:sp>
-    </p:spTree>
-    <p:extLst>
-      <p:ext uri="{BB962C8B-B14F-4D97-AF65-F5344CB8AC3E}">
-        <p14:creationId xmlns:p14="http://schemas.microsoft.com/office/powerpoint/2010/main" val="1024086991"/>
-      </p:ext>
-    </p:extLst>
-  </p:cSld>
-  <p:clrMapOvr>
-    <a:masterClrMapping/>
-  </p:clrMapOvr>
-</p:notes>
-</file>
-
-<file path=ppt/notesSlides/notesSlide29.xml><?xml version="1.0" encoding="utf-8"?>
-<p:notes xmlns:a="http://schemas.openxmlformats.org/drawingml/2006/main" xmlns:r="http://schemas.openxmlformats.org/officeDocument/2006/relationships" xmlns:p="http://schemas.openxmlformats.org/presentationml/2006/main">
-  <p:cSld>
-    <p:spTree>
-      <p:nvGrpSpPr>
-        <p:cNvPr id="1" name=""/>
-        <p:cNvGrpSpPr/>
-        <p:nvPr/>
-      </p:nvGrpSpPr>
-      <p:grpSpPr>
-        <a:xfrm>
-          <a:off x="0" y="0"/>
-          <a:ext cx="0" cy="0"/>
-          <a:chOff x="0" y="0"/>
-          <a:chExt cx="0" cy="0"/>
-        </a:xfrm>
-      </p:grpSpPr>
-      <p:sp>
-        <p:nvSpPr>
-          <p:cNvPr id="2" name="Slide Image Placeholder 1"/>
-          <p:cNvSpPr>
-            <a:spLocks noGrp="1" noRot="1" noChangeAspect="1"/>
-          </p:cNvSpPr>
-          <p:nvPr>
-            <p:ph type="sldImg"/>
-          </p:nvPr>
-        </p:nvSpPr>
-        <p:spPr/>
-      </p:sp>
-      <p:sp>
-        <p:nvSpPr>
-          <p:cNvPr id="3" name="Notes Placeholder 2"/>
-          <p:cNvSpPr>
-            <a:spLocks noGrp="1"/>
-          </p:cNvSpPr>
-          <p:nvPr>
-            <p:ph type="body" idx="1"/>
-          </p:nvPr>
-        </p:nvSpPr>
-        <p:spPr/>
-        <p:txBody>
-          <a:bodyPr/>
-          <a:lstStyle/>
-          <a:p>
-            <a:r>
-              <a:rPr lang="en-US" dirty="0"/>
-              <a:t/>
-            </a:r>
-            <a:endParaRPr lang="en-US" dirty="0"/>
-          </a:p>
-        </p:txBody>
-      </p:sp>
-      <p:sp>
-        <p:nvSpPr>
-          <p:cNvPr id="4" name="Slide Number Placeholder 3"/>
-          <p:cNvSpPr>
-            <a:spLocks noGrp="1"/>
-          </p:cNvSpPr>
-          <p:nvPr>
-            <p:ph type="sldNum" sz="quarter" idx="10"/>
-          </p:nvPr>
-        </p:nvSpPr>
-        <p:spPr/>
-        <p:txBody>
-          <a:bodyPr/>
-          <a:lstStyle/>
-          <a:p>
-            <a:fld id="{F7021451-1387-4CA6-816F-3879F97B5CBC}" type="slidenum">
-              <a:rPr lang="en-US"/>
-              <a:t>29</a:t>
-            </a:fld>
-            <a:endParaRPr lang="en-US"/>
-          </a:p>
-        </p:txBody>
-      </p:sp>
-    </p:spTree>
-    <p:extLst>
-      <p:ext uri="{BB962C8B-B14F-4D97-AF65-F5344CB8AC3E}">
-        <p14:creationId xmlns:p14="http://schemas.microsoft.com/office/powerpoint/2010/main" val="1024086991"/>
-      </p:ext>
-    </p:extLst>
-  </p:cSld>
-  <p:clrMapOvr>
-    <a:masterClrMapping/>
-  </p:clrMapOvr>
-</p:notes>
-</file>
-
-<file path=ppt/notesSlides/notesSlide3.xml><?xml version="1.0" encoding="utf-8"?>
-<p:notes xmlns:a="http://schemas.openxmlformats.org/drawingml/2006/main" xmlns:r="http://schemas.openxmlformats.org/officeDocument/2006/relationships" xmlns:p="http://schemas.openxmlformats.org/presentationml/2006/main">
-  <p:cSld>
-    <p:spTree>
-      <p:nvGrpSpPr>
-        <p:cNvPr id="1" name=""/>
-        <p:cNvGrpSpPr/>
-        <p:nvPr/>
-      </p:nvGrpSpPr>
-      <p:grpSpPr>
-        <a:xfrm>
-          <a:off x="0" y="0"/>
-          <a:ext cx="0" cy="0"/>
-          <a:chOff x="0" y="0"/>
-          <a:chExt cx="0" cy="0"/>
-        </a:xfrm>
-      </p:grpSpPr>
-      <p:sp>
-        <p:nvSpPr>
-          <p:cNvPr id="2" name="Slide Image Placeholder 1"/>
-          <p:cNvSpPr>
-            <a:spLocks noGrp="1" noRot="1" noChangeAspect="1"/>
-          </p:cNvSpPr>
-          <p:nvPr>
-            <p:ph type="sldImg"/>
-          </p:nvPr>
-        </p:nvSpPr>
-        <p:spPr/>
-      </p:sp>
-      <p:sp>
-        <p:nvSpPr>
-          <p:cNvPr id="3" name="Notes Placeholder 2"/>
-          <p:cNvSpPr>
-            <a:spLocks noGrp="1"/>
-          </p:cNvSpPr>
-          <p:nvPr>
-            <p:ph type="body" idx="1"/>
-          </p:nvPr>
-        </p:nvSpPr>
-        <p:spPr/>
-        <p:txBody>
-          <a:bodyPr/>
-          <a:lstStyle/>
-          <a:p>
-            <a:r>
-              <a:rPr lang="en-US" dirty="0"/>
-              <a:t/>
-            </a:r>
-            <a:endParaRPr lang="en-US" dirty="0"/>
-          </a:p>
-        </p:txBody>
-      </p:sp>
-      <p:sp>
-        <p:nvSpPr>
-          <p:cNvPr id="4" name="Slide Number Placeholder 3"/>
-          <p:cNvSpPr>
-            <a:spLocks noGrp="1"/>
-          </p:cNvSpPr>
-          <p:nvPr>
-            <p:ph type="sldNum" sz="quarter" idx="10"/>
-          </p:nvPr>
-        </p:nvSpPr>
-        <p:spPr/>
-        <p:txBody>
-          <a:bodyPr/>
-          <a:lstStyle/>
-          <a:p>
-            <a:fld id="{F7021451-1387-4CA6-816F-3879F97B5CBC}" type="slidenum">
-              <a:rPr lang="en-US"/>
-              <a:t>3</a:t>
-            </a:fld>
-            <a:endParaRPr lang="en-US"/>
-          </a:p>
-        </p:txBody>
-      </p:sp>
-    </p:spTree>
-    <p:extLst>
-      <p:ext uri="{BB962C8B-B14F-4D97-AF65-F5344CB8AC3E}">
-        <p14:creationId xmlns:p14="http://schemas.microsoft.com/office/powerpoint/2010/main" val="1024086991"/>
-      </p:ext>
-    </p:extLst>
-  </p:cSld>
-  <p:clrMapOvr>
-    <a:masterClrMapping/>
-  </p:clrMapOvr>
-</p:notes>
-</file>
-
-<file path=ppt/notesSlides/notesSlide30.xml><?xml version="1.0" encoding="utf-8"?>
-<p:notes xmlns:a="http://schemas.openxmlformats.org/drawingml/2006/main" xmlns:r="http://schemas.openxmlformats.org/officeDocument/2006/relationships" xmlns:p="http://schemas.openxmlformats.org/presentationml/2006/main">
-  <p:cSld>
-    <p:spTree>
-      <p:nvGrpSpPr>
-        <p:cNvPr id="1" name=""/>
-        <p:cNvGrpSpPr/>
-        <p:nvPr/>
-      </p:nvGrpSpPr>
-      <p:grpSpPr>
-        <a:xfrm>
-          <a:off x="0" y="0"/>
-          <a:ext cx="0" cy="0"/>
-          <a:chOff x="0" y="0"/>
-          <a:chExt cx="0" cy="0"/>
-        </a:xfrm>
-      </p:grpSpPr>
-      <p:sp>
-        <p:nvSpPr>
-          <p:cNvPr id="2" name="Slide Image Placeholder 1"/>
-          <p:cNvSpPr>
-            <a:spLocks noGrp="1" noRot="1" noChangeAspect="1"/>
-          </p:cNvSpPr>
-          <p:nvPr>
-            <p:ph type="sldImg"/>
-          </p:nvPr>
-        </p:nvSpPr>
-        <p:spPr/>
-      </p:sp>
-      <p:sp>
-        <p:nvSpPr>
-          <p:cNvPr id="3" name="Notes Placeholder 2"/>
-          <p:cNvSpPr>
-            <a:spLocks noGrp="1"/>
-          </p:cNvSpPr>
-          <p:nvPr>
-            <p:ph type="body" idx="1"/>
-          </p:nvPr>
-        </p:nvSpPr>
-        <p:spPr/>
-        <p:txBody>
-          <a:bodyPr/>
-          <a:lstStyle/>
-          <a:p>
-            <a:r>
-              <a:rPr lang="en-US" dirty="0"/>
-              <a:t/>
-            </a:r>
-            <a:endParaRPr lang="en-US" dirty="0"/>
-          </a:p>
-        </p:txBody>
-      </p:sp>
-      <p:sp>
-        <p:nvSpPr>
-          <p:cNvPr id="4" name="Slide Number Placeholder 3"/>
-          <p:cNvSpPr>
-            <a:spLocks noGrp="1"/>
-          </p:cNvSpPr>
-          <p:nvPr>
-            <p:ph type="sldNum" sz="quarter" idx="10"/>
-          </p:nvPr>
-        </p:nvSpPr>
-        <p:spPr/>
-        <p:txBody>
-          <a:bodyPr/>
-          <a:lstStyle/>
-          <a:p>
-            <a:fld id="{F7021451-1387-4CA6-816F-3879F97B5CBC}" type="slidenum">
-              <a:rPr lang="en-US"/>
-              <a:t>30</a:t>
-            </a:fld>
-            <a:endParaRPr lang="en-US"/>
-          </a:p>
-        </p:txBody>
-      </p:sp>
-    </p:spTree>
-    <p:extLst>
-      <p:ext uri="{BB962C8B-B14F-4D97-AF65-F5344CB8AC3E}">
-        <p14:creationId xmlns:p14="http://schemas.microsoft.com/office/powerpoint/2010/main" val="1024086991"/>
-      </p:ext>
-    </p:extLst>
-  </p:cSld>
-  <p:clrMapOvr>
-    <a:masterClrMapping/>
-  </p:clrMapOvr>
-</p:notes>
-</file>
-
-<file path=ppt/notesSlides/notesSlide31.xml><?xml version="1.0" encoding="utf-8"?>
-<p:notes xmlns:a="http://schemas.openxmlformats.org/drawingml/2006/main" xmlns:r="http://schemas.openxmlformats.org/officeDocument/2006/relationships" xmlns:p="http://schemas.openxmlformats.org/presentationml/2006/main">
-  <p:cSld>
-    <p:spTree>
-      <p:nvGrpSpPr>
-        <p:cNvPr id="1" name=""/>
-        <p:cNvGrpSpPr/>
-        <p:nvPr/>
-      </p:nvGrpSpPr>
-      <p:grpSpPr>
-        <a:xfrm>
-          <a:off x="0" y="0"/>
-          <a:ext cx="0" cy="0"/>
-          <a:chOff x="0" y="0"/>
-          <a:chExt cx="0" cy="0"/>
-        </a:xfrm>
-      </p:grpSpPr>
-      <p:sp>
-        <p:nvSpPr>
-          <p:cNvPr id="2" name="Slide Image Placeholder 1"/>
-          <p:cNvSpPr>
-            <a:spLocks noGrp="1" noRot="1" noChangeAspect="1"/>
-          </p:cNvSpPr>
-          <p:nvPr>
-            <p:ph type="sldImg"/>
-          </p:nvPr>
-        </p:nvSpPr>
-        <p:spPr/>
-      </p:sp>
-      <p:sp>
-        <p:nvSpPr>
-          <p:cNvPr id="3" name="Notes Placeholder 2"/>
-          <p:cNvSpPr>
-            <a:spLocks noGrp="1"/>
-          </p:cNvSpPr>
-          <p:nvPr>
-            <p:ph type="body" idx="1"/>
-          </p:nvPr>
-        </p:nvSpPr>
-        <p:spPr/>
-        <p:txBody>
-          <a:bodyPr/>
-          <a:lstStyle/>
-          <a:p>
-            <a:r>
-              <a:rPr lang="en-US" dirty="0"/>
-              <a:t/>
-            </a:r>
-            <a:endParaRPr lang="en-US" dirty="0"/>
-          </a:p>
-        </p:txBody>
-      </p:sp>
-      <p:sp>
-        <p:nvSpPr>
-          <p:cNvPr id="4" name="Slide Number Placeholder 3"/>
-          <p:cNvSpPr>
-            <a:spLocks noGrp="1"/>
-          </p:cNvSpPr>
-          <p:nvPr>
-            <p:ph type="sldNum" sz="quarter" idx="10"/>
-          </p:nvPr>
-        </p:nvSpPr>
-        <p:spPr/>
-        <p:txBody>
-          <a:bodyPr/>
-          <a:lstStyle/>
-          <a:p>
-            <a:fld id="{F7021451-1387-4CA6-816F-3879F97B5CBC}" type="slidenum">
-              <a:rPr lang="en-US"/>
-              <a:t>31</a:t>
-            </a:fld>
-            <a:endParaRPr lang="en-US"/>
-          </a:p>
-        </p:txBody>
-      </p:sp>
-    </p:spTree>
-    <p:extLst>
-      <p:ext uri="{BB962C8B-B14F-4D97-AF65-F5344CB8AC3E}">
-        <p14:creationId xmlns:p14="http://schemas.microsoft.com/office/powerpoint/2010/main" val="1024086991"/>
-      </p:ext>
-    </p:extLst>
-  </p:cSld>
-  <p:clrMapOvr>
-    <a:masterClrMapping/>
-  </p:clrMapOvr>
-</p:notes>
-</file>
-
-<file path=ppt/notesSlides/notesSlide32.xml><?xml version="1.0" encoding="utf-8"?>
-<p:notes xmlns:a="http://schemas.openxmlformats.org/drawingml/2006/main" xmlns:r="http://schemas.openxmlformats.org/officeDocument/2006/relationships" xmlns:p="http://schemas.openxmlformats.org/presentationml/2006/main">
-  <p:cSld>
-    <p:spTree>
-      <p:nvGrpSpPr>
-        <p:cNvPr id="1" name=""/>
-        <p:cNvGrpSpPr/>
-        <p:nvPr/>
-      </p:nvGrpSpPr>
-      <p:grpSpPr>
-        <a:xfrm>
-          <a:off x="0" y="0"/>
-          <a:ext cx="0" cy="0"/>
-          <a:chOff x="0" y="0"/>
-          <a:chExt cx="0" cy="0"/>
-        </a:xfrm>
-      </p:grpSpPr>
-      <p:sp>
-        <p:nvSpPr>
-          <p:cNvPr id="2" name="Slide Image Placeholder 1"/>
-          <p:cNvSpPr>
-            <a:spLocks noGrp="1" noRot="1" noChangeAspect="1"/>
-          </p:cNvSpPr>
-          <p:nvPr>
-            <p:ph type="sldImg"/>
-          </p:nvPr>
-        </p:nvSpPr>
-        <p:spPr/>
-      </p:sp>
-      <p:sp>
-        <p:nvSpPr>
-          <p:cNvPr id="3" name="Notes Placeholder 2"/>
-          <p:cNvSpPr>
-            <a:spLocks noGrp="1"/>
-          </p:cNvSpPr>
-          <p:nvPr>
-            <p:ph type="body" idx="1"/>
-          </p:nvPr>
-        </p:nvSpPr>
-        <p:spPr/>
-        <p:txBody>
-          <a:bodyPr/>
-          <a:lstStyle/>
-          <a:p>
-            <a:r>
-              <a:rPr lang="en-US" dirty="0"/>
-              <a:t/>
-            </a:r>
-            <a:endParaRPr lang="en-US" dirty="0"/>
-          </a:p>
-        </p:txBody>
-      </p:sp>
-      <p:sp>
-        <p:nvSpPr>
-          <p:cNvPr id="4" name="Slide Number Placeholder 3"/>
-          <p:cNvSpPr>
-            <a:spLocks noGrp="1"/>
-          </p:cNvSpPr>
-          <p:nvPr>
-            <p:ph type="sldNum" sz="quarter" idx="10"/>
-          </p:nvPr>
-        </p:nvSpPr>
-        <p:spPr/>
-        <p:txBody>
-          <a:bodyPr/>
-          <a:lstStyle/>
-          <a:p>
-            <a:fld id="{F7021451-1387-4CA6-816F-3879F97B5CBC}" type="slidenum">
-              <a:rPr lang="en-US"/>
-              <a:t>32</a:t>
-            </a:fld>
-            <a:endParaRPr lang="en-US"/>
-          </a:p>
-        </p:txBody>
-      </p:sp>
-    </p:spTree>
-    <p:extLst>
-      <p:ext uri="{BB962C8B-B14F-4D97-AF65-F5344CB8AC3E}">
-        <p14:creationId xmlns:p14="http://schemas.microsoft.com/office/powerpoint/2010/main" val="1024086991"/>
-      </p:ext>
-    </p:extLst>
-  </p:cSld>
-  <p:clrMapOvr>
-    <a:masterClrMapping/>
-  </p:clrMapOvr>
-</p:notes>
-</file>
-
-<file path=ppt/notesSlides/notesSlide33.xml><?xml version="1.0" encoding="utf-8"?>
-<p:notes xmlns:a="http://schemas.openxmlformats.org/drawingml/2006/main" xmlns:r="http://schemas.openxmlformats.org/officeDocument/2006/relationships" xmlns:p="http://schemas.openxmlformats.org/presentationml/2006/main">
-  <p:cSld>
-    <p:spTree>
-      <p:nvGrpSpPr>
-        <p:cNvPr id="1" name=""/>
-        <p:cNvGrpSpPr/>
-        <p:nvPr/>
-      </p:nvGrpSpPr>
-      <p:grpSpPr>
-        <a:xfrm>
-          <a:off x="0" y="0"/>
-          <a:ext cx="0" cy="0"/>
-          <a:chOff x="0" y="0"/>
-          <a:chExt cx="0" cy="0"/>
-        </a:xfrm>
-      </p:grpSpPr>
-      <p:sp>
-        <p:nvSpPr>
-          <p:cNvPr id="2" name="Slide Image Placeholder 1"/>
-          <p:cNvSpPr>
-            <a:spLocks noGrp="1" noRot="1" noChangeAspect="1"/>
-          </p:cNvSpPr>
-          <p:nvPr>
-            <p:ph type="sldImg"/>
-          </p:nvPr>
-        </p:nvSpPr>
-        <p:spPr/>
-      </p:sp>
-      <p:sp>
-        <p:nvSpPr>
-          <p:cNvPr id="3" name="Notes Placeholder 2"/>
-          <p:cNvSpPr>
-            <a:spLocks noGrp="1"/>
-          </p:cNvSpPr>
-          <p:nvPr>
-            <p:ph type="body" idx="1"/>
-          </p:nvPr>
-        </p:nvSpPr>
-        <p:spPr/>
-        <p:txBody>
-          <a:bodyPr/>
-          <a:lstStyle/>
-          <a:p>
-            <a:r>
-              <a:rPr lang="en-US" dirty="0"/>
-              <a:t/>
-            </a:r>
-            <a:endParaRPr lang="en-US" dirty="0"/>
-          </a:p>
-        </p:txBody>
-      </p:sp>
-      <p:sp>
-        <p:nvSpPr>
-          <p:cNvPr id="4" name="Slide Number Placeholder 3"/>
-          <p:cNvSpPr>
-            <a:spLocks noGrp="1"/>
-          </p:cNvSpPr>
-          <p:nvPr>
-            <p:ph type="sldNum" sz="quarter" idx="10"/>
-          </p:nvPr>
-        </p:nvSpPr>
-        <p:spPr/>
-        <p:txBody>
-          <a:bodyPr/>
-          <a:lstStyle/>
-          <a:p>
-            <a:fld id="{F7021451-1387-4CA6-816F-3879F97B5CBC}" type="slidenum">
-              <a:rPr lang="en-US"/>
-              <a:t>33</a:t>
-            </a:fld>
-            <a:endParaRPr lang="en-US"/>
-          </a:p>
-        </p:txBody>
-      </p:sp>
-    </p:spTree>
-    <p:extLst>
-      <p:ext uri="{BB962C8B-B14F-4D97-AF65-F5344CB8AC3E}">
-        <p14:creationId xmlns:p14="http://schemas.microsoft.com/office/powerpoint/2010/main" val="1024086991"/>
-      </p:ext>
-    </p:extLst>
-  </p:cSld>
-  <p:clrMapOvr>
-    <a:masterClrMapping/>
-  </p:clrMapOvr>
-</p:notes>
-</file>
-
-<file path=ppt/notesSlides/notesSlide34.xml><?xml version="1.0" encoding="utf-8"?>
-<p:notes xmlns:a="http://schemas.openxmlformats.org/drawingml/2006/main" xmlns:r="http://schemas.openxmlformats.org/officeDocument/2006/relationships" xmlns:p="http://schemas.openxmlformats.org/presentationml/2006/main">
-  <p:cSld>
-    <p:spTree>
-      <p:nvGrpSpPr>
-        <p:cNvPr id="1" name=""/>
-        <p:cNvGrpSpPr/>
-        <p:nvPr/>
-      </p:nvGrpSpPr>
-      <p:grpSpPr>
-        <a:xfrm>
-          <a:off x="0" y="0"/>
-          <a:ext cx="0" cy="0"/>
-          <a:chOff x="0" y="0"/>
-          <a:chExt cx="0" cy="0"/>
-        </a:xfrm>
-      </p:grpSpPr>
-      <p:sp>
-        <p:nvSpPr>
-          <p:cNvPr id="2" name="Slide Image Placeholder 1"/>
-          <p:cNvSpPr>
-            <a:spLocks noGrp="1" noRot="1" noChangeAspect="1"/>
-          </p:cNvSpPr>
-          <p:nvPr>
-            <p:ph type="sldImg"/>
-          </p:nvPr>
-        </p:nvSpPr>
-        <p:spPr/>
-      </p:sp>
-      <p:sp>
-        <p:nvSpPr>
-          <p:cNvPr id="3" name="Notes Placeholder 2"/>
-          <p:cNvSpPr>
-            <a:spLocks noGrp="1"/>
-          </p:cNvSpPr>
-          <p:nvPr>
-            <p:ph type="body" idx="1"/>
-          </p:nvPr>
-        </p:nvSpPr>
-        <p:spPr/>
-        <p:txBody>
-          <a:bodyPr/>
-          <a:lstStyle/>
-          <a:p>
-            <a:r>
-              <a:rPr lang="en-US" dirty="0"/>
-              <a:t/>
-            </a:r>
-            <a:endParaRPr lang="en-US" dirty="0"/>
-          </a:p>
-        </p:txBody>
-      </p:sp>
-      <p:sp>
-        <p:nvSpPr>
-          <p:cNvPr id="4" name="Slide Number Placeholder 3"/>
-          <p:cNvSpPr>
-            <a:spLocks noGrp="1"/>
-          </p:cNvSpPr>
-          <p:nvPr>
-            <p:ph type="sldNum" sz="quarter" idx="10"/>
-          </p:nvPr>
-        </p:nvSpPr>
-        <p:spPr/>
-        <p:txBody>
-          <a:bodyPr/>
-          <a:lstStyle/>
-          <a:p>
-            <a:fld id="{F7021451-1387-4CA6-816F-3879F97B5CBC}" type="slidenum">
-              <a:rPr lang="en-US"/>
-              <a:t>34</a:t>
-            </a:fld>
-            <a:endParaRPr lang="en-US"/>
-          </a:p>
-        </p:txBody>
-      </p:sp>
-    </p:spTree>
-    <p:extLst>
-      <p:ext uri="{BB962C8B-B14F-4D97-AF65-F5344CB8AC3E}">
-        <p14:creationId xmlns:p14="http://schemas.microsoft.com/office/powerpoint/2010/main" val="1024086991"/>
-      </p:ext>
-    </p:extLst>
-  </p:cSld>
-  <p:clrMapOvr>
-    <a:masterClrMapping/>
-  </p:clrMapOvr>
-</p:notes>
-</file>
-
-<file path=ppt/notesSlides/notesSlide35.xml><?xml version="1.0" encoding="utf-8"?>
-<p:notes xmlns:a="http://schemas.openxmlformats.org/drawingml/2006/main" xmlns:r="http://schemas.openxmlformats.org/officeDocument/2006/relationships" xmlns:p="http://schemas.openxmlformats.org/presentationml/2006/main">
-  <p:cSld>
-    <p:spTree>
-      <p:nvGrpSpPr>
-        <p:cNvPr id="1" name=""/>
-        <p:cNvGrpSpPr/>
-        <p:nvPr/>
-      </p:nvGrpSpPr>
-      <p:grpSpPr>
-        <a:xfrm>
-          <a:off x="0" y="0"/>
-          <a:ext cx="0" cy="0"/>
-          <a:chOff x="0" y="0"/>
-          <a:chExt cx="0" cy="0"/>
-        </a:xfrm>
-      </p:grpSpPr>
-      <p:sp>
-        <p:nvSpPr>
-          <p:cNvPr id="2" name="Slide Image Placeholder 1"/>
-          <p:cNvSpPr>
-            <a:spLocks noGrp="1" noRot="1" noChangeAspect="1"/>
-          </p:cNvSpPr>
-          <p:nvPr>
-            <p:ph type="sldImg"/>
-          </p:nvPr>
-        </p:nvSpPr>
-        <p:spPr/>
-      </p:sp>
-      <p:sp>
-        <p:nvSpPr>
-          <p:cNvPr id="3" name="Notes Placeholder 2"/>
-          <p:cNvSpPr>
-            <a:spLocks noGrp="1"/>
-          </p:cNvSpPr>
-          <p:nvPr>
-            <p:ph type="body" idx="1"/>
-          </p:nvPr>
-        </p:nvSpPr>
-        <p:spPr/>
-        <p:txBody>
-          <a:bodyPr/>
-          <a:lstStyle/>
-          <a:p>
-            <a:r>
-              <a:rPr lang="en-US" dirty="0"/>
-              <a:t/>
-            </a:r>
-            <a:endParaRPr lang="en-US" dirty="0"/>
-          </a:p>
-        </p:txBody>
-      </p:sp>
-      <p:sp>
-        <p:nvSpPr>
-          <p:cNvPr id="4" name="Slide Number Placeholder 3"/>
-          <p:cNvSpPr>
-            <a:spLocks noGrp="1"/>
-          </p:cNvSpPr>
-          <p:nvPr>
-            <p:ph type="sldNum" sz="quarter" idx="10"/>
-          </p:nvPr>
-        </p:nvSpPr>
-        <p:spPr/>
-        <p:txBody>
-          <a:bodyPr/>
-          <a:lstStyle/>
-          <a:p>
-            <a:fld id="{F7021451-1387-4CA6-816F-3879F97B5CBC}" type="slidenum">
-              <a:rPr lang="en-US"/>
-              <a:t>35</a:t>
-            </a:fld>
-            <a:endParaRPr lang="en-US"/>
-          </a:p>
-        </p:txBody>
-      </p:sp>
-    </p:spTree>
-    <p:extLst>
-      <p:ext uri="{BB962C8B-B14F-4D97-AF65-F5344CB8AC3E}">
-        <p14:creationId xmlns:p14="http://schemas.microsoft.com/office/powerpoint/2010/main" val="1024086991"/>
-      </p:ext>
-    </p:extLst>
-  </p:cSld>
-  <p:clrMapOvr>
-    <a:masterClrMapping/>
-  </p:clrMapOvr>
-</p:notes>
-</file>
-
-<file path=ppt/notesSlides/notesSlide36.xml><?xml version="1.0" encoding="utf-8"?>
-<p:notes xmlns:a="http://schemas.openxmlformats.org/drawingml/2006/main" xmlns:r="http://schemas.openxmlformats.org/officeDocument/2006/relationships" xmlns:p="http://schemas.openxmlformats.org/presentationml/2006/main">
-  <p:cSld>
-    <p:spTree>
-      <p:nvGrpSpPr>
-        <p:cNvPr id="1" name=""/>
-        <p:cNvGrpSpPr/>
-        <p:nvPr/>
-      </p:nvGrpSpPr>
-      <p:grpSpPr>
-        <a:xfrm>
-          <a:off x="0" y="0"/>
-          <a:ext cx="0" cy="0"/>
-          <a:chOff x="0" y="0"/>
-          <a:chExt cx="0" cy="0"/>
-        </a:xfrm>
-      </p:grpSpPr>
-      <p:sp>
-        <p:nvSpPr>
-          <p:cNvPr id="2" name="Slide Image Placeholder 1"/>
-          <p:cNvSpPr>
-            <a:spLocks noGrp="1" noRot="1" noChangeAspect="1"/>
-          </p:cNvSpPr>
-          <p:nvPr>
-            <p:ph type="sldImg"/>
-          </p:nvPr>
-        </p:nvSpPr>
-        <p:spPr/>
-      </p:sp>
-      <p:sp>
-        <p:nvSpPr>
-          <p:cNvPr id="3" name="Notes Placeholder 2"/>
-          <p:cNvSpPr>
-            <a:spLocks noGrp="1"/>
-          </p:cNvSpPr>
-          <p:nvPr>
-            <p:ph type="body" idx="1"/>
-          </p:nvPr>
-        </p:nvSpPr>
-        <p:spPr/>
-        <p:txBody>
-          <a:bodyPr/>
-          <a:lstStyle/>
-          <a:p>
-            <a:r>
-              <a:rPr lang="en-US" dirty="0"/>
-              <a:t/>
-            </a:r>
-            <a:endParaRPr lang="en-US" dirty="0"/>
-          </a:p>
-        </p:txBody>
-      </p:sp>
-      <p:sp>
-        <p:nvSpPr>
-          <p:cNvPr id="4" name="Slide Number Placeholder 3"/>
-          <p:cNvSpPr>
-            <a:spLocks noGrp="1"/>
-          </p:cNvSpPr>
-          <p:nvPr>
-            <p:ph type="sldNum" sz="quarter" idx="10"/>
-          </p:nvPr>
-        </p:nvSpPr>
-        <p:spPr/>
-        <p:txBody>
-          <a:bodyPr/>
-          <a:lstStyle/>
-          <a:p>
-            <a:fld id="{F7021451-1387-4CA6-816F-3879F97B5CBC}" type="slidenum">
-              <a:rPr lang="en-US"/>
-              <a:t>36</a:t>
-            </a:fld>
-            <a:endParaRPr lang="en-US"/>
-          </a:p>
-        </p:txBody>
-      </p:sp>
-    </p:spTree>
-    <p:extLst>
-      <p:ext uri="{BB962C8B-B14F-4D97-AF65-F5344CB8AC3E}">
-        <p14:creationId xmlns:p14="http://schemas.microsoft.com/office/powerpoint/2010/main" val="1024086991"/>
-      </p:ext>
-    </p:extLst>
-  </p:cSld>
-  <p:clrMapOvr>
-    <a:masterClrMapping/>
-  </p:clrMapOvr>
-</p:notes>
-</file>
-
-<file path=ppt/notesSlides/notesSlide37.xml><?xml version="1.0" encoding="utf-8"?>
-<p:notes xmlns:a="http://schemas.openxmlformats.org/drawingml/2006/main" xmlns:r="http://schemas.openxmlformats.org/officeDocument/2006/relationships" xmlns:p="http://schemas.openxmlformats.org/presentationml/2006/main">
-  <p:cSld>
-    <p:spTree>
-      <p:nvGrpSpPr>
-        <p:cNvPr id="1" name=""/>
-        <p:cNvGrpSpPr/>
-        <p:nvPr/>
-      </p:nvGrpSpPr>
-      <p:grpSpPr>
-        <a:xfrm>
-          <a:off x="0" y="0"/>
-          <a:ext cx="0" cy="0"/>
-          <a:chOff x="0" y="0"/>
-          <a:chExt cx="0" cy="0"/>
-        </a:xfrm>
-      </p:grpSpPr>
-      <p:sp>
-        <p:nvSpPr>
-          <p:cNvPr id="2" name="Slide Image Placeholder 1"/>
-          <p:cNvSpPr>
-            <a:spLocks noGrp="1" noRot="1" noChangeAspect="1"/>
-          </p:cNvSpPr>
-          <p:nvPr>
-            <p:ph type="sldImg"/>
-          </p:nvPr>
-        </p:nvSpPr>
-        <p:spPr/>
-      </p:sp>
-      <p:sp>
-        <p:nvSpPr>
-          <p:cNvPr id="3" name="Notes Placeholder 2"/>
-          <p:cNvSpPr>
-            <a:spLocks noGrp="1"/>
-          </p:cNvSpPr>
-          <p:nvPr>
-            <p:ph type="body" idx="1"/>
-          </p:nvPr>
-        </p:nvSpPr>
-        <p:spPr/>
-        <p:txBody>
-          <a:bodyPr/>
-          <a:lstStyle/>
-          <a:p>
-            <a:r>
-              <a:rPr lang="en-US" dirty="0"/>
-              <a:t/>
-            </a:r>
-            <a:endParaRPr lang="en-US" dirty="0"/>
-          </a:p>
-        </p:txBody>
-      </p:sp>
-      <p:sp>
-        <p:nvSpPr>
-          <p:cNvPr id="4" name="Slide Number Placeholder 3"/>
-          <p:cNvSpPr>
-            <a:spLocks noGrp="1"/>
-          </p:cNvSpPr>
-          <p:nvPr>
-            <p:ph type="sldNum" sz="quarter" idx="10"/>
-          </p:nvPr>
-        </p:nvSpPr>
-        <p:spPr/>
-        <p:txBody>
-          <a:bodyPr/>
-          <a:lstStyle/>
-          <a:p>
-            <a:fld id="{F7021451-1387-4CA6-816F-3879F97B5CBC}" type="slidenum">
-              <a:rPr lang="en-US"/>
-              <a:t>37</a:t>
-            </a:fld>
-            <a:endParaRPr lang="en-US"/>
-          </a:p>
-        </p:txBody>
-      </p:sp>
-    </p:spTree>
-    <p:extLst>
-      <p:ext uri="{BB962C8B-B14F-4D97-AF65-F5344CB8AC3E}">
-        <p14:creationId xmlns:p14="http://schemas.microsoft.com/office/powerpoint/2010/main" val="1024086991"/>
-      </p:ext>
-    </p:extLst>
-  </p:cSld>
-  <p:clrMapOvr>
-    <a:masterClrMapping/>
-  </p:clrMapOvr>
-</p:notes>
-</file>
-
-<file path=ppt/notesSlides/notesSlide38.xml><?xml version="1.0" encoding="utf-8"?>
-<p:notes xmlns:a="http://schemas.openxmlformats.org/drawingml/2006/main" xmlns:r="http://schemas.openxmlformats.org/officeDocument/2006/relationships" xmlns:p="http://schemas.openxmlformats.org/presentationml/2006/main">
-  <p:cSld>
-    <p:spTree>
-      <p:nvGrpSpPr>
-        <p:cNvPr id="1" name=""/>
-        <p:cNvGrpSpPr/>
-        <p:nvPr/>
-      </p:nvGrpSpPr>
-      <p:grpSpPr>
-        <a:xfrm>
-          <a:off x="0" y="0"/>
-          <a:ext cx="0" cy="0"/>
-          <a:chOff x="0" y="0"/>
-          <a:chExt cx="0" cy="0"/>
-        </a:xfrm>
-      </p:grpSpPr>
-      <p:sp>
-        <p:nvSpPr>
-          <p:cNvPr id="2" name="Slide Image Placeholder 1"/>
-          <p:cNvSpPr>
-            <a:spLocks noGrp="1" noRot="1" noChangeAspect="1"/>
-          </p:cNvSpPr>
-          <p:nvPr>
-            <p:ph type="sldImg"/>
-          </p:nvPr>
-        </p:nvSpPr>
-        <p:spPr/>
-      </p:sp>
-      <p:sp>
-        <p:nvSpPr>
-          <p:cNvPr id="3" name="Notes Placeholder 2"/>
-          <p:cNvSpPr>
-            <a:spLocks noGrp="1"/>
-          </p:cNvSpPr>
-          <p:nvPr>
-            <p:ph type="body" idx="1"/>
-          </p:nvPr>
-        </p:nvSpPr>
-        <p:spPr/>
-        <p:txBody>
-          <a:bodyPr/>
-          <a:lstStyle/>
-          <a:p>
-            <a:r>
-              <a:rPr lang="en-US" dirty="0"/>
-              <a:t/>
-            </a:r>
-            <a:endParaRPr lang="en-US" dirty="0"/>
-          </a:p>
-        </p:txBody>
-      </p:sp>
-      <p:sp>
-        <p:nvSpPr>
-          <p:cNvPr id="4" name="Slide Number Placeholder 3"/>
-          <p:cNvSpPr>
-            <a:spLocks noGrp="1"/>
-          </p:cNvSpPr>
-          <p:nvPr>
-            <p:ph type="sldNum" sz="quarter" idx="10"/>
-          </p:nvPr>
-        </p:nvSpPr>
-        <p:spPr/>
-        <p:txBody>
-          <a:bodyPr/>
-          <a:lstStyle/>
-          <a:p>
-            <a:fld id="{F7021451-1387-4CA6-816F-3879F97B5CBC}" type="slidenum">
-              <a:rPr lang="en-US"/>
-              <a:t>38</a:t>
-            </a:fld>
-            <a:endParaRPr lang="en-US"/>
-          </a:p>
-        </p:txBody>
-      </p:sp>
-    </p:spTree>
-    <p:extLst>
-      <p:ext uri="{BB962C8B-B14F-4D97-AF65-F5344CB8AC3E}">
-        <p14:creationId xmlns:p14="http://schemas.microsoft.com/office/powerpoint/2010/main" val="1024086991"/>
-      </p:ext>
-    </p:extLst>
-  </p:cSld>
-  <p:clrMapOvr>
-    <a:masterClrMapping/>
-  </p:clrMapOvr>
-</p:notes>
-</file>
-
-<file path=ppt/notesSlides/notesSlide39.xml><?xml version="1.0" encoding="utf-8"?>
-<p:notes xmlns:a="http://schemas.openxmlformats.org/drawingml/2006/main" xmlns:r="http://schemas.openxmlformats.org/officeDocument/2006/relationships" xmlns:p="http://schemas.openxmlformats.org/presentationml/2006/main">
-  <p:cSld>
-    <p:spTree>
-      <p:nvGrpSpPr>
-        <p:cNvPr id="1" name=""/>
-        <p:cNvGrpSpPr/>
-        <p:nvPr/>
-      </p:nvGrpSpPr>
-      <p:grpSpPr>
-        <a:xfrm>
-          <a:off x="0" y="0"/>
-          <a:ext cx="0" cy="0"/>
-          <a:chOff x="0" y="0"/>
-          <a:chExt cx="0" cy="0"/>
-        </a:xfrm>
-      </p:grpSpPr>
-      <p:sp>
-        <p:nvSpPr>
-          <p:cNvPr id="2" name="Slide Image Placeholder 1"/>
-          <p:cNvSpPr>
-            <a:spLocks noGrp="1" noRot="1" noChangeAspect="1"/>
-          </p:cNvSpPr>
-          <p:nvPr>
-            <p:ph type="sldImg"/>
-          </p:nvPr>
-        </p:nvSpPr>
-        <p:spPr/>
-      </p:sp>
-      <p:sp>
-        <p:nvSpPr>
-          <p:cNvPr id="3" name="Notes Placeholder 2"/>
-          <p:cNvSpPr>
-            <a:spLocks noGrp="1"/>
-          </p:cNvSpPr>
-          <p:nvPr>
-            <p:ph type="body" idx="1"/>
-          </p:nvPr>
-        </p:nvSpPr>
-        <p:spPr/>
-        <p:txBody>
-          <a:bodyPr/>
-          <a:lstStyle/>
-          <a:p>
-            <a:r>
-              <a:rPr lang="en-US" dirty="0"/>
-              <a:t/>
-            </a:r>
-            <a:endParaRPr lang="en-US" dirty="0"/>
-          </a:p>
-        </p:txBody>
-      </p:sp>
-      <p:sp>
-        <p:nvSpPr>
-          <p:cNvPr id="4" name="Slide Number Placeholder 3"/>
-          <p:cNvSpPr>
-            <a:spLocks noGrp="1"/>
-          </p:cNvSpPr>
-          <p:nvPr>
-            <p:ph type="sldNum" sz="quarter" idx="10"/>
-          </p:nvPr>
-        </p:nvSpPr>
-        <p:spPr/>
-        <p:txBody>
-          <a:bodyPr/>
-          <a:lstStyle/>
-          <a:p>
-            <a:fld id="{F7021451-1387-4CA6-816F-3879F97B5CBC}" type="slidenum">
-              <a:rPr lang="en-US"/>
-              <a:t>39</a:t>
-            </a:fld>
-            <a:endParaRPr lang="en-US"/>
-          </a:p>
-        </p:txBody>
-      </p:sp>
-    </p:spTree>
-    <p:extLst>
-      <p:ext uri="{BB962C8B-B14F-4D97-AF65-F5344CB8AC3E}">
-        <p14:creationId xmlns:p14="http://schemas.microsoft.com/office/powerpoint/2010/main" val="1024086991"/>
-      </p:ext>
-    </p:extLst>
-  </p:cSld>
-  <p:clrMapOvr>
-    <a:masterClrMapping/>
-  </p:clrMapOvr>
-</p:notes>
-</file>
-
-<file path=ppt/notesSlides/notesSlide4.xml><?xml version="1.0" encoding="utf-8"?>
-<p:notes xmlns:a="http://schemas.openxmlformats.org/drawingml/2006/main" xmlns:r="http://schemas.openxmlformats.org/officeDocument/2006/relationships" xmlns:p="http://schemas.openxmlformats.org/presentationml/2006/main">
-  <p:cSld>
-    <p:spTree>
-      <p:nvGrpSpPr>
-        <p:cNvPr id="1" name=""/>
-        <p:cNvGrpSpPr/>
-        <p:nvPr/>
-      </p:nvGrpSpPr>
-      <p:grpSpPr>
-        <a:xfrm>
-          <a:off x="0" y="0"/>
-          <a:ext cx="0" cy="0"/>
-          <a:chOff x="0" y="0"/>
-          <a:chExt cx="0" cy="0"/>
-        </a:xfrm>
-      </p:grpSpPr>
-      <p:sp>
-        <p:nvSpPr>
-          <p:cNvPr id="2" name="Slide Image Placeholder 1"/>
-          <p:cNvSpPr>
-            <a:spLocks noGrp="1" noRot="1" noChangeAspect="1"/>
-          </p:cNvSpPr>
-          <p:nvPr>
-            <p:ph type="sldImg"/>
-          </p:nvPr>
-        </p:nvSpPr>
-        <p:spPr/>
-      </p:sp>
-      <p:sp>
-        <p:nvSpPr>
-          <p:cNvPr id="3" name="Notes Placeholder 2"/>
-          <p:cNvSpPr>
-            <a:spLocks noGrp="1"/>
-          </p:cNvSpPr>
-          <p:nvPr>
-            <p:ph type="body" idx="1"/>
-          </p:nvPr>
-        </p:nvSpPr>
-        <p:spPr/>
-        <p:txBody>
-          <a:bodyPr/>
-          <a:lstStyle/>
-          <a:p>
-            <a:r>
-              <a:rPr lang="en-US" dirty="0"/>
-              <a:t/>
-            </a:r>
-            <a:endParaRPr lang="en-US" dirty="0"/>
-          </a:p>
-        </p:txBody>
-      </p:sp>
-      <p:sp>
-        <p:nvSpPr>
-          <p:cNvPr id="4" name="Slide Number Placeholder 3"/>
-          <p:cNvSpPr>
-            <a:spLocks noGrp="1"/>
-          </p:cNvSpPr>
-          <p:nvPr>
-            <p:ph type="sldNum" sz="quarter" idx="10"/>
-          </p:nvPr>
-        </p:nvSpPr>
-        <p:spPr/>
-        <p:txBody>
-          <a:bodyPr/>
-          <a:lstStyle/>
-          <a:p>
-            <a:fld id="{F7021451-1387-4CA6-816F-3879F97B5CBC}" type="slidenum">
-              <a:rPr lang="en-US"/>
-              <a:t>4</a:t>
-            </a:fld>
-            <a:endParaRPr lang="en-US"/>
-          </a:p>
-        </p:txBody>
-      </p:sp>
-    </p:spTree>
-    <p:extLst>
-      <p:ext uri="{BB962C8B-B14F-4D97-AF65-F5344CB8AC3E}">
-        <p14:creationId xmlns:p14="http://schemas.microsoft.com/office/powerpoint/2010/main" val="1024086991"/>
-      </p:ext>
-    </p:extLst>
-  </p:cSld>
-  <p:clrMapOvr>
-    <a:masterClrMapping/>
-  </p:clrMapOvr>
-</p:notes>
-</file>
-
-<file path=ppt/notesSlides/notesSlide40.xml><?xml version="1.0" encoding="utf-8"?>
-<p:notes xmlns:a="http://schemas.openxmlformats.org/drawingml/2006/main" xmlns:r="http://schemas.openxmlformats.org/officeDocument/2006/relationships" xmlns:p="http://schemas.openxmlformats.org/presentationml/2006/main">
-  <p:cSld>
-    <p:spTree>
-      <p:nvGrpSpPr>
-        <p:cNvPr id="1" name=""/>
-        <p:cNvGrpSpPr/>
-        <p:nvPr/>
-      </p:nvGrpSpPr>
-      <p:grpSpPr>
-        <a:xfrm>
-          <a:off x="0" y="0"/>
-          <a:ext cx="0" cy="0"/>
-          <a:chOff x="0" y="0"/>
-          <a:chExt cx="0" cy="0"/>
-        </a:xfrm>
-      </p:grpSpPr>
-      <p:sp>
-        <p:nvSpPr>
-          <p:cNvPr id="2" name="Slide Image Placeholder 1"/>
-          <p:cNvSpPr>
-            <a:spLocks noGrp="1" noRot="1" noChangeAspect="1"/>
-          </p:cNvSpPr>
-          <p:nvPr>
-            <p:ph type="sldImg"/>
-          </p:nvPr>
-        </p:nvSpPr>
-        <p:spPr/>
-      </p:sp>
-      <p:sp>
-        <p:nvSpPr>
-          <p:cNvPr id="3" name="Notes Placeholder 2"/>
-          <p:cNvSpPr>
-            <a:spLocks noGrp="1"/>
-          </p:cNvSpPr>
-          <p:nvPr>
-            <p:ph type="body" idx="1"/>
-          </p:nvPr>
-        </p:nvSpPr>
-        <p:spPr/>
-        <p:txBody>
-          <a:bodyPr/>
-          <a:lstStyle/>
-          <a:p>
-            <a:r>
-              <a:rPr lang="en-US" dirty="0"/>
-              <a:t/>
-            </a:r>
-            <a:endParaRPr lang="en-US" dirty="0"/>
-          </a:p>
-        </p:txBody>
-      </p:sp>
-      <p:sp>
-        <p:nvSpPr>
-          <p:cNvPr id="4" name="Slide Number Placeholder 3"/>
-          <p:cNvSpPr>
-            <a:spLocks noGrp="1"/>
-          </p:cNvSpPr>
-          <p:nvPr>
-            <p:ph type="sldNum" sz="quarter" idx="10"/>
-          </p:nvPr>
-        </p:nvSpPr>
-        <p:spPr/>
-        <p:txBody>
-          <a:bodyPr/>
-          <a:lstStyle/>
-          <a:p>
-            <a:fld id="{F7021451-1387-4CA6-816F-3879F97B5CBC}" type="slidenum">
-              <a:rPr lang="en-US"/>
-              <a:t>40</a:t>
-            </a:fld>
-            <a:endParaRPr lang="en-US"/>
-          </a:p>
-        </p:txBody>
-      </p:sp>
-    </p:spTree>
-    <p:extLst>
-      <p:ext uri="{BB962C8B-B14F-4D97-AF65-F5344CB8AC3E}">
-        <p14:creationId xmlns:p14="http://schemas.microsoft.com/office/powerpoint/2010/main" val="1024086991"/>
-      </p:ext>
-    </p:extLst>
-  </p:cSld>
-  <p:clrMapOvr>
-    <a:masterClrMapping/>
-  </p:clrMapOvr>
-</p:notes>
-</file>
-
-<file path=ppt/notesSlides/notesSlide41.xml><?xml version="1.0" encoding="utf-8"?>
-<p:notes xmlns:a="http://schemas.openxmlformats.org/drawingml/2006/main" xmlns:r="http://schemas.openxmlformats.org/officeDocument/2006/relationships" xmlns:p="http://schemas.openxmlformats.org/presentationml/2006/main">
-  <p:cSld>
-    <p:spTree>
-      <p:nvGrpSpPr>
-        <p:cNvPr id="1" name=""/>
-        <p:cNvGrpSpPr/>
-        <p:nvPr/>
-      </p:nvGrpSpPr>
-      <p:grpSpPr>
-        <a:xfrm>
-          <a:off x="0" y="0"/>
-          <a:ext cx="0" cy="0"/>
-          <a:chOff x="0" y="0"/>
-          <a:chExt cx="0" cy="0"/>
-        </a:xfrm>
-      </p:grpSpPr>
-      <p:sp>
-        <p:nvSpPr>
-          <p:cNvPr id="2" name="Slide Image Placeholder 1"/>
-          <p:cNvSpPr>
-            <a:spLocks noGrp="1" noRot="1" noChangeAspect="1"/>
-          </p:cNvSpPr>
-          <p:nvPr>
-            <p:ph type="sldImg"/>
-          </p:nvPr>
-        </p:nvSpPr>
-        <p:spPr/>
-      </p:sp>
-      <p:sp>
-        <p:nvSpPr>
-          <p:cNvPr id="3" name="Notes Placeholder 2"/>
-          <p:cNvSpPr>
-            <a:spLocks noGrp="1"/>
-          </p:cNvSpPr>
-          <p:nvPr>
-            <p:ph type="body" idx="1"/>
-          </p:nvPr>
-        </p:nvSpPr>
-        <p:spPr/>
-        <p:txBody>
-          <a:bodyPr/>
-          <a:lstStyle/>
-          <a:p>
-            <a:r>
-              <a:rPr lang="en-US" dirty="0"/>
-              <a:t/>
-            </a:r>
-            <a:endParaRPr lang="en-US" dirty="0"/>
-          </a:p>
-        </p:txBody>
-      </p:sp>
-      <p:sp>
-        <p:nvSpPr>
-          <p:cNvPr id="4" name="Slide Number Placeholder 3"/>
-          <p:cNvSpPr>
-            <a:spLocks noGrp="1"/>
-          </p:cNvSpPr>
-          <p:nvPr>
-            <p:ph type="sldNum" sz="quarter" idx="10"/>
-          </p:nvPr>
-        </p:nvSpPr>
-        <p:spPr/>
-        <p:txBody>
-          <a:bodyPr/>
-          <a:lstStyle/>
-          <a:p>
-            <a:fld id="{F7021451-1387-4CA6-816F-3879F97B5CBC}" type="slidenum">
-              <a:rPr lang="en-US"/>
-              <a:t>41</a:t>
-            </a:fld>
-            <a:endParaRPr lang="en-US"/>
-          </a:p>
-        </p:txBody>
-      </p:sp>
-    </p:spTree>
-    <p:extLst>
-      <p:ext uri="{BB962C8B-B14F-4D97-AF65-F5344CB8AC3E}">
-        <p14:creationId xmlns:p14="http://schemas.microsoft.com/office/powerpoint/2010/main" val="1024086991"/>
-      </p:ext>
-    </p:extLst>
-  </p:cSld>
-  <p:clrMapOvr>
-    <a:masterClrMapping/>
-  </p:clrMapOvr>
-</p:notes>
-</file>
-
-<file path=ppt/notesSlides/notesSlide42.xml><?xml version="1.0" encoding="utf-8"?>
-<p:notes xmlns:a="http://schemas.openxmlformats.org/drawingml/2006/main" xmlns:r="http://schemas.openxmlformats.org/officeDocument/2006/relationships" xmlns:p="http://schemas.openxmlformats.org/presentationml/2006/main">
-  <p:cSld>
-    <p:spTree>
-      <p:nvGrpSpPr>
-        <p:cNvPr id="1" name=""/>
-        <p:cNvGrpSpPr/>
-        <p:nvPr/>
-      </p:nvGrpSpPr>
-      <p:grpSpPr>
-        <a:xfrm>
-          <a:off x="0" y="0"/>
-          <a:ext cx="0" cy="0"/>
-          <a:chOff x="0" y="0"/>
-          <a:chExt cx="0" cy="0"/>
-        </a:xfrm>
-      </p:grpSpPr>
-      <p:sp>
-        <p:nvSpPr>
-          <p:cNvPr id="2" name="Slide Image Placeholder 1"/>
-          <p:cNvSpPr>
-            <a:spLocks noGrp="1" noRot="1" noChangeAspect="1"/>
-          </p:cNvSpPr>
-          <p:nvPr>
-            <p:ph type="sldImg"/>
-          </p:nvPr>
-        </p:nvSpPr>
-        <p:spPr/>
-      </p:sp>
-      <p:sp>
-        <p:nvSpPr>
-          <p:cNvPr id="3" name="Notes Placeholder 2"/>
-          <p:cNvSpPr>
-            <a:spLocks noGrp="1"/>
-          </p:cNvSpPr>
-          <p:nvPr>
-            <p:ph type="body" idx="1"/>
-          </p:nvPr>
-        </p:nvSpPr>
-        <p:spPr/>
-        <p:txBody>
-          <a:bodyPr/>
-          <a:lstStyle/>
-          <a:p>
-            <a:r>
-              <a:rPr lang="en-US" dirty="0"/>
-              <a:t/>
-            </a:r>
-            <a:endParaRPr lang="en-US" dirty="0"/>
-          </a:p>
-        </p:txBody>
-      </p:sp>
-      <p:sp>
-        <p:nvSpPr>
-          <p:cNvPr id="4" name="Slide Number Placeholder 3"/>
-          <p:cNvSpPr>
-            <a:spLocks noGrp="1"/>
-          </p:cNvSpPr>
-          <p:nvPr>
-            <p:ph type="sldNum" sz="quarter" idx="10"/>
-          </p:nvPr>
-        </p:nvSpPr>
-        <p:spPr/>
-        <p:txBody>
-          <a:bodyPr/>
-          <a:lstStyle/>
-          <a:p>
-            <a:fld id="{F7021451-1387-4CA6-816F-3879F97B5CBC}" type="slidenum">
-              <a:rPr lang="en-US"/>
-              <a:t>42</a:t>
-            </a:fld>
-            <a:endParaRPr lang="en-US"/>
-          </a:p>
-        </p:txBody>
-      </p:sp>
-    </p:spTree>
-    <p:extLst>
-      <p:ext uri="{BB962C8B-B14F-4D97-AF65-F5344CB8AC3E}">
-        <p14:creationId xmlns:p14="http://schemas.microsoft.com/office/powerpoint/2010/main" val="1024086991"/>
-      </p:ext>
-    </p:extLst>
-  </p:cSld>
-  <p:clrMapOvr>
-    <a:masterClrMapping/>
-  </p:clrMapOvr>
-</p:notes>
-</file>
-
-<file path=ppt/notesSlides/notesSlide43.xml><?xml version="1.0" encoding="utf-8"?>
-<p:notes xmlns:a="http://schemas.openxmlformats.org/drawingml/2006/main" xmlns:r="http://schemas.openxmlformats.org/officeDocument/2006/relationships" xmlns:p="http://schemas.openxmlformats.org/presentationml/2006/main">
-  <p:cSld>
-    <p:spTree>
-      <p:nvGrpSpPr>
-        <p:cNvPr id="1" name=""/>
-        <p:cNvGrpSpPr/>
-        <p:nvPr/>
-      </p:nvGrpSpPr>
-      <p:grpSpPr>
-        <a:xfrm>
-          <a:off x="0" y="0"/>
-          <a:ext cx="0" cy="0"/>
-          <a:chOff x="0" y="0"/>
-          <a:chExt cx="0" cy="0"/>
-        </a:xfrm>
-      </p:grpSpPr>
-      <p:sp>
-        <p:nvSpPr>
-          <p:cNvPr id="2" name="Slide Image Placeholder 1"/>
-          <p:cNvSpPr>
-            <a:spLocks noGrp="1" noRot="1" noChangeAspect="1"/>
-          </p:cNvSpPr>
-          <p:nvPr>
-            <p:ph type="sldImg"/>
-          </p:nvPr>
-        </p:nvSpPr>
-        <p:spPr/>
-      </p:sp>
-      <p:sp>
-        <p:nvSpPr>
-          <p:cNvPr id="3" name="Notes Placeholder 2"/>
-          <p:cNvSpPr>
-            <a:spLocks noGrp="1"/>
-          </p:cNvSpPr>
-          <p:nvPr>
-            <p:ph type="body" idx="1"/>
-          </p:nvPr>
-        </p:nvSpPr>
-        <p:spPr/>
-        <p:txBody>
-          <a:bodyPr/>
-          <a:lstStyle/>
-          <a:p>
-            <a:r>
-              <a:rPr lang="en-US" dirty="0"/>
-              <a:t/>
-            </a:r>
-            <a:endParaRPr lang="en-US" dirty="0"/>
-          </a:p>
-        </p:txBody>
-      </p:sp>
-      <p:sp>
-        <p:nvSpPr>
-          <p:cNvPr id="4" name="Slide Number Placeholder 3"/>
-          <p:cNvSpPr>
-            <a:spLocks noGrp="1"/>
-          </p:cNvSpPr>
-          <p:nvPr>
-            <p:ph type="sldNum" sz="quarter" idx="10"/>
-          </p:nvPr>
-        </p:nvSpPr>
-        <p:spPr/>
-        <p:txBody>
-          <a:bodyPr/>
-          <a:lstStyle/>
-          <a:p>
-            <a:fld id="{F7021451-1387-4CA6-816F-3879F97B5CBC}" type="slidenum">
-              <a:rPr lang="en-US"/>
-              <a:t>43</a:t>
-            </a:fld>
-            <a:endParaRPr lang="en-US"/>
-          </a:p>
-        </p:txBody>
-      </p:sp>
-    </p:spTree>
-    <p:extLst>
-      <p:ext uri="{BB962C8B-B14F-4D97-AF65-F5344CB8AC3E}">
-        <p14:creationId xmlns:p14="http://schemas.microsoft.com/office/powerpoint/2010/main" val="1024086991"/>
-      </p:ext>
-    </p:extLst>
-  </p:cSld>
-  <p:clrMapOvr>
-    <a:masterClrMapping/>
-  </p:clrMapOvr>
-</p:notes>
-</file>
-
-<file path=ppt/notesSlides/notesSlide44.xml><?xml version="1.0" encoding="utf-8"?>
-<p:notes xmlns:a="http://schemas.openxmlformats.org/drawingml/2006/main" xmlns:r="http://schemas.openxmlformats.org/officeDocument/2006/relationships" xmlns:p="http://schemas.openxmlformats.org/presentationml/2006/main">
-  <p:cSld>
-    <p:spTree>
-      <p:nvGrpSpPr>
-        <p:cNvPr id="1" name=""/>
-        <p:cNvGrpSpPr/>
-        <p:nvPr/>
-      </p:nvGrpSpPr>
-      <p:grpSpPr>
-        <a:xfrm>
-          <a:off x="0" y="0"/>
-          <a:ext cx="0" cy="0"/>
-          <a:chOff x="0" y="0"/>
-          <a:chExt cx="0" cy="0"/>
-        </a:xfrm>
-      </p:grpSpPr>
-      <p:sp>
-        <p:nvSpPr>
-          <p:cNvPr id="2" name="Slide Image Placeholder 1"/>
-          <p:cNvSpPr>
-            <a:spLocks noGrp="1" noRot="1" noChangeAspect="1"/>
-          </p:cNvSpPr>
-          <p:nvPr>
-            <p:ph type="sldImg"/>
-          </p:nvPr>
-        </p:nvSpPr>
-        <p:spPr/>
-      </p:sp>
-      <p:sp>
-        <p:nvSpPr>
-          <p:cNvPr id="3" name="Notes Placeholder 2"/>
-          <p:cNvSpPr>
-            <a:spLocks noGrp="1"/>
-          </p:cNvSpPr>
-          <p:nvPr>
-            <p:ph type="body" idx="1"/>
-          </p:nvPr>
-        </p:nvSpPr>
-        <p:spPr/>
-        <p:txBody>
-          <a:bodyPr/>
-          <a:lstStyle/>
-          <a:p>
-            <a:r>
-              <a:rPr lang="en-US" dirty="0"/>
-              <a:t/>
-            </a:r>
-            <a:endParaRPr lang="en-US" dirty="0"/>
-          </a:p>
-        </p:txBody>
-      </p:sp>
-      <p:sp>
-        <p:nvSpPr>
-          <p:cNvPr id="4" name="Slide Number Placeholder 3"/>
-          <p:cNvSpPr>
-            <a:spLocks noGrp="1"/>
-          </p:cNvSpPr>
-          <p:nvPr>
-            <p:ph type="sldNum" sz="quarter" idx="10"/>
-          </p:nvPr>
-        </p:nvSpPr>
-        <p:spPr/>
-        <p:txBody>
-          <a:bodyPr/>
-          <a:lstStyle/>
-          <a:p>
-            <a:fld id="{F7021451-1387-4CA6-816F-3879F97B5CBC}" type="slidenum">
-              <a:rPr lang="en-US"/>
-              <a:t>44</a:t>
-            </a:fld>
-            <a:endParaRPr lang="en-US"/>
-          </a:p>
-        </p:txBody>
-      </p:sp>
-    </p:spTree>
-    <p:extLst>
-      <p:ext uri="{BB962C8B-B14F-4D97-AF65-F5344CB8AC3E}">
-        <p14:creationId xmlns:p14="http://schemas.microsoft.com/office/powerpoint/2010/main" val="1024086991"/>
-      </p:ext>
-    </p:extLst>
-  </p:cSld>
-  <p:clrMapOvr>
-    <a:masterClrMapping/>
-  </p:clrMapOvr>
-</p:notes>
-</file>
-
-<file path=ppt/notesSlides/notesSlide45.xml><?xml version="1.0" encoding="utf-8"?>
-<p:notes xmlns:a="http://schemas.openxmlformats.org/drawingml/2006/main" xmlns:r="http://schemas.openxmlformats.org/officeDocument/2006/relationships" xmlns:p="http://schemas.openxmlformats.org/presentationml/2006/main">
-  <p:cSld>
-    <p:spTree>
-      <p:nvGrpSpPr>
-        <p:cNvPr id="1" name=""/>
-        <p:cNvGrpSpPr/>
-        <p:nvPr/>
-      </p:nvGrpSpPr>
-      <p:grpSpPr>
-        <a:xfrm>
-          <a:off x="0" y="0"/>
-          <a:ext cx="0" cy="0"/>
-          <a:chOff x="0" y="0"/>
-          <a:chExt cx="0" cy="0"/>
-        </a:xfrm>
-      </p:grpSpPr>
-      <p:sp>
-        <p:nvSpPr>
-          <p:cNvPr id="2" name="Slide Image Placeholder 1"/>
-          <p:cNvSpPr>
-            <a:spLocks noGrp="1" noRot="1" noChangeAspect="1"/>
-          </p:cNvSpPr>
-          <p:nvPr>
-            <p:ph type="sldImg"/>
-          </p:nvPr>
-        </p:nvSpPr>
-        <p:spPr/>
-      </p:sp>
-      <p:sp>
-        <p:nvSpPr>
-          <p:cNvPr id="3" name="Notes Placeholder 2"/>
-          <p:cNvSpPr>
-            <a:spLocks noGrp="1"/>
-          </p:cNvSpPr>
-          <p:nvPr>
-            <p:ph type="body" idx="1"/>
-          </p:nvPr>
-        </p:nvSpPr>
-        <p:spPr/>
-        <p:txBody>
-          <a:bodyPr/>
-          <a:lstStyle/>
-          <a:p>
-            <a:r>
-              <a:rPr lang="en-US" dirty="0"/>
-              <a:t/>
-            </a:r>
-            <a:endParaRPr lang="en-US" dirty="0"/>
-          </a:p>
-        </p:txBody>
-      </p:sp>
-      <p:sp>
-        <p:nvSpPr>
-          <p:cNvPr id="4" name="Slide Number Placeholder 3"/>
-          <p:cNvSpPr>
-            <a:spLocks noGrp="1"/>
-          </p:cNvSpPr>
-          <p:nvPr>
-            <p:ph type="sldNum" sz="quarter" idx="10"/>
-          </p:nvPr>
-        </p:nvSpPr>
-        <p:spPr/>
-        <p:txBody>
-          <a:bodyPr/>
-          <a:lstStyle/>
-          <a:p>
-            <a:fld id="{F7021451-1387-4CA6-816F-3879F97B5CBC}" type="slidenum">
-              <a:rPr lang="en-US"/>
-              <a:t>45</a:t>
-            </a:fld>
-            <a:endParaRPr lang="en-US"/>
-          </a:p>
-        </p:txBody>
-      </p:sp>
-    </p:spTree>
-    <p:extLst>
-      <p:ext uri="{BB962C8B-B14F-4D97-AF65-F5344CB8AC3E}">
-        <p14:creationId xmlns:p14="http://schemas.microsoft.com/office/powerpoint/2010/main" val="1024086991"/>
-      </p:ext>
-    </p:extLst>
-  </p:cSld>
-  <p:clrMapOvr>
-    <a:masterClrMapping/>
-  </p:clrMapOvr>
-</p:notes>
-</file>
-
-<file path=ppt/notesSlides/notesSlide46.xml><?xml version="1.0" encoding="utf-8"?>
-<p:notes xmlns:a="http://schemas.openxmlformats.org/drawingml/2006/main" xmlns:r="http://schemas.openxmlformats.org/officeDocument/2006/relationships" xmlns:p="http://schemas.openxmlformats.org/presentationml/2006/main">
-  <p:cSld>
-    <p:spTree>
-      <p:nvGrpSpPr>
-        <p:cNvPr id="1" name=""/>
-        <p:cNvGrpSpPr/>
-        <p:nvPr/>
-      </p:nvGrpSpPr>
-      <p:grpSpPr>
-        <a:xfrm>
-          <a:off x="0" y="0"/>
-          <a:ext cx="0" cy="0"/>
-          <a:chOff x="0" y="0"/>
-          <a:chExt cx="0" cy="0"/>
-        </a:xfrm>
-      </p:grpSpPr>
-      <p:sp>
-        <p:nvSpPr>
-          <p:cNvPr id="2" name="Slide Image Placeholder 1"/>
-          <p:cNvSpPr>
-            <a:spLocks noGrp="1" noRot="1" noChangeAspect="1"/>
-          </p:cNvSpPr>
-          <p:nvPr>
-            <p:ph type="sldImg"/>
-          </p:nvPr>
-        </p:nvSpPr>
-        <p:spPr/>
-      </p:sp>
-      <p:sp>
-        <p:nvSpPr>
-          <p:cNvPr id="3" name="Notes Placeholder 2"/>
-          <p:cNvSpPr>
-            <a:spLocks noGrp="1"/>
-          </p:cNvSpPr>
-          <p:nvPr>
-            <p:ph type="body" idx="1"/>
-          </p:nvPr>
-        </p:nvSpPr>
-        <p:spPr/>
-        <p:txBody>
-          <a:bodyPr/>
-          <a:lstStyle/>
-          <a:p>
-            <a:r>
-              <a:rPr lang="en-US" dirty="0"/>
-              <a:t/>
-            </a:r>
-            <a:endParaRPr lang="en-US" dirty="0"/>
-          </a:p>
-        </p:txBody>
-      </p:sp>
-      <p:sp>
-        <p:nvSpPr>
-          <p:cNvPr id="4" name="Slide Number Placeholder 3"/>
-          <p:cNvSpPr>
-            <a:spLocks noGrp="1"/>
-          </p:cNvSpPr>
-          <p:nvPr>
-            <p:ph type="sldNum" sz="quarter" idx="10"/>
-          </p:nvPr>
-        </p:nvSpPr>
-        <p:spPr/>
-        <p:txBody>
-          <a:bodyPr/>
-          <a:lstStyle/>
-          <a:p>
-            <a:fld id="{F7021451-1387-4CA6-816F-3879F97B5CBC}" type="slidenum">
-              <a:rPr lang="en-US"/>
-              <a:t>46</a:t>
-            </a:fld>
-            <a:endParaRPr lang="en-US"/>
-          </a:p>
-        </p:txBody>
-      </p:sp>
-    </p:spTree>
-    <p:extLst>
-      <p:ext uri="{BB962C8B-B14F-4D97-AF65-F5344CB8AC3E}">
-        <p14:creationId xmlns:p14="http://schemas.microsoft.com/office/powerpoint/2010/main" val="1024086991"/>
-      </p:ext>
-    </p:extLst>
-  </p:cSld>
-  <p:clrMapOvr>
-    <a:masterClrMapping/>
-  </p:clrMapOvr>
-</p:notes>
-</file>
-
-<file path=ppt/notesSlides/notesSlide47.xml><?xml version="1.0" encoding="utf-8"?>
-<p:notes xmlns:a="http://schemas.openxmlformats.org/drawingml/2006/main" xmlns:r="http://schemas.openxmlformats.org/officeDocument/2006/relationships" xmlns:p="http://schemas.openxmlformats.org/presentationml/2006/main">
-  <p:cSld>
-    <p:spTree>
-      <p:nvGrpSpPr>
-        <p:cNvPr id="1" name=""/>
-        <p:cNvGrpSpPr/>
-        <p:nvPr/>
-      </p:nvGrpSpPr>
-      <p:grpSpPr>
-        <a:xfrm>
-          <a:off x="0" y="0"/>
-          <a:ext cx="0" cy="0"/>
-          <a:chOff x="0" y="0"/>
-          <a:chExt cx="0" cy="0"/>
-        </a:xfrm>
-      </p:grpSpPr>
-      <p:sp>
-        <p:nvSpPr>
-          <p:cNvPr id="2" name="Slide Image Placeholder 1"/>
-          <p:cNvSpPr>
-            <a:spLocks noGrp="1" noRot="1" noChangeAspect="1"/>
-          </p:cNvSpPr>
-          <p:nvPr>
-            <p:ph type="sldImg"/>
-          </p:nvPr>
-        </p:nvSpPr>
-        <p:spPr/>
-      </p:sp>
-      <p:sp>
-        <p:nvSpPr>
-          <p:cNvPr id="3" name="Notes Placeholder 2"/>
-          <p:cNvSpPr>
-            <a:spLocks noGrp="1"/>
-          </p:cNvSpPr>
-          <p:nvPr>
-            <p:ph type="body" idx="1"/>
-          </p:nvPr>
-        </p:nvSpPr>
-        <p:spPr/>
-        <p:txBody>
-          <a:bodyPr/>
-          <a:lstStyle/>
-          <a:p>
-            <a:r>
-              <a:rPr lang="en-US" dirty="0"/>
-              <a:t/>
-            </a:r>
-            <a:endParaRPr lang="en-US" dirty="0"/>
-          </a:p>
-        </p:txBody>
-      </p:sp>
-      <p:sp>
-        <p:nvSpPr>
-          <p:cNvPr id="4" name="Slide Number Placeholder 3"/>
-          <p:cNvSpPr>
-            <a:spLocks noGrp="1"/>
-          </p:cNvSpPr>
-          <p:nvPr>
-            <p:ph type="sldNum" sz="quarter" idx="10"/>
-          </p:nvPr>
-        </p:nvSpPr>
-        <p:spPr/>
-        <p:txBody>
-          <a:bodyPr/>
-          <a:lstStyle/>
-          <a:p>
-            <a:fld id="{F7021451-1387-4CA6-816F-3879F97B5CBC}" type="slidenum">
-              <a:rPr lang="en-US"/>
-              <a:t>47</a:t>
-            </a:fld>
-            <a:endParaRPr lang="en-US"/>
-          </a:p>
-        </p:txBody>
-      </p:sp>
-    </p:spTree>
-    <p:extLst>
-      <p:ext uri="{BB962C8B-B14F-4D97-AF65-F5344CB8AC3E}">
-        <p14:creationId xmlns:p14="http://schemas.microsoft.com/office/powerpoint/2010/main" val="1024086991"/>
-      </p:ext>
-    </p:extLst>
-  </p:cSld>
-  <p:clrMapOvr>
-    <a:masterClrMapping/>
-  </p:clrMapOvr>
-</p:notes>
-</file>
-
-<file path=ppt/notesSlides/notesSlide48.xml><?xml version="1.0" encoding="utf-8"?>
-<p:notes xmlns:a="http://schemas.openxmlformats.org/drawingml/2006/main" xmlns:r="http://schemas.openxmlformats.org/officeDocument/2006/relationships" xmlns:p="http://schemas.openxmlformats.org/presentationml/2006/main">
-  <p:cSld>
-    <p:spTree>
-      <p:nvGrpSpPr>
-        <p:cNvPr id="1" name=""/>
-        <p:cNvGrpSpPr/>
-        <p:nvPr/>
-      </p:nvGrpSpPr>
-      <p:grpSpPr>
-        <a:xfrm>
-          <a:off x="0" y="0"/>
-          <a:ext cx="0" cy="0"/>
-          <a:chOff x="0" y="0"/>
-          <a:chExt cx="0" cy="0"/>
-        </a:xfrm>
-      </p:grpSpPr>
-      <p:sp>
-        <p:nvSpPr>
-          <p:cNvPr id="2" name="Slide Image Placeholder 1"/>
-          <p:cNvSpPr>
-            <a:spLocks noGrp="1" noRot="1" noChangeAspect="1"/>
-          </p:cNvSpPr>
-          <p:nvPr>
-            <p:ph type="sldImg"/>
-          </p:nvPr>
-        </p:nvSpPr>
-        <p:spPr/>
-      </p:sp>
-      <p:sp>
-        <p:nvSpPr>
-          <p:cNvPr id="3" name="Notes Placeholder 2"/>
-          <p:cNvSpPr>
-            <a:spLocks noGrp="1"/>
-          </p:cNvSpPr>
-          <p:nvPr>
-            <p:ph type="body" idx="1"/>
-          </p:nvPr>
-        </p:nvSpPr>
-        <p:spPr/>
-        <p:txBody>
-          <a:bodyPr/>
-          <a:lstStyle/>
-          <a:p>
-            <a:r>
-              <a:rPr lang="en-US" dirty="0"/>
-              <a:t/>
-            </a:r>
-            <a:endParaRPr lang="en-US" dirty="0"/>
-          </a:p>
-        </p:txBody>
-      </p:sp>
-      <p:sp>
-        <p:nvSpPr>
-          <p:cNvPr id="4" name="Slide Number Placeholder 3"/>
-          <p:cNvSpPr>
-            <a:spLocks noGrp="1"/>
-          </p:cNvSpPr>
-          <p:nvPr>
-            <p:ph type="sldNum" sz="quarter" idx="10"/>
-          </p:nvPr>
-        </p:nvSpPr>
-        <p:spPr/>
-        <p:txBody>
-          <a:bodyPr/>
-          <a:lstStyle/>
-          <a:p>
-            <a:fld id="{F7021451-1387-4CA6-816F-3879F97B5CBC}" type="slidenum">
-              <a:rPr lang="en-US"/>
-              <a:t>48</a:t>
-            </a:fld>
-            <a:endParaRPr lang="en-US"/>
-          </a:p>
-        </p:txBody>
-      </p:sp>
-    </p:spTree>
-    <p:extLst>
-      <p:ext uri="{BB962C8B-B14F-4D97-AF65-F5344CB8AC3E}">
-        <p14:creationId xmlns:p14="http://schemas.microsoft.com/office/powerpoint/2010/main" val="1024086991"/>
-      </p:ext>
-    </p:extLst>
-  </p:cSld>
-  <p:clrMapOvr>
-    <a:masterClrMapping/>
-  </p:clrMapOvr>
-</p:notes>
-</file>
-
-<file path=ppt/notesSlides/notesSlide49.xml><?xml version="1.0" encoding="utf-8"?>
-<p:notes xmlns:a="http://schemas.openxmlformats.org/drawingml/2006/main" xmlns:r="http://schemas.openxmlformats.org/officeDocument/2006/relationships" xmlns:p="http://schemas.openxmlformats.org/presentationml/2006/main">
-  <p:cSld>
-    <p:spTree>
-      <p:nvGrpSpPr>
-        <p:cNvPr id="1" name=""/>
-        <p:cNvGrpSpPr/>
-        <p:nvPr/>
-      </p:nvGrpSpPr>
-      <p:grpSpPr>
-        <a:xfrm>
-          <a:off x="0" y="0"/>
-          <a:ext cx="0" cy="0"/>
-          <a:chOff x="0" y="0"/>
-          <a:chExt cx="0" cy="0"/>
-        </a:xfrm>
-      </p:grpSpPr>
-      <p:sp>
-        <p:nvSpPr>
-          <p:cNvPr id="2" name="Slide Image Placeholder 1"/>
-          <p:cNvSpPr>
-            <a:spLocks noGrp="1" noRot="1" noChangeAspect="1"/>
-          </p:cNvSpPr>
-          <p:nvPr>
-            <p:ph type="sldImg"/>
-          </p:nvPr>
-        </p:nvSpPr>
-        <p:spPr/>
-      </p:sp>
-      <p:sp>
-        <p:nvSpPr>
-          <p:cNvPr id="3" name="Notes Placeholder 2"/>
-          <p:cNvSpPr>
-            <a:spLocks noGrp="1"/>
-          </p:cNvSpPr>
-          <p:nvPr>
-            <p:ph type="body" idx="1"/>
-          </p:nvPr>
-        </p:nvSpPr>
-        <p:spPr/>
-        <p:txBody>
-          <a:bodyPr/>
-          <a:lstStyle/>
-          <a:p>
-            <a:r>
-              <a:rPr lang="en-US" dirty="0"/>
-              <a:t/>
-            </a:r>
-            <a:endParaRPr lang="en-US" dirty="0"/>
-          </a:p>
-        </p:txBody>
-      </p:sp>
-      <p:sp>
-        <p:nvSpPr>
-          <p:cNvPr id="4" name="Slide Number Placeholder 3"/>
-          <p:cNvSpPr>
-            <a:spLocks noGrp="1"/>
-          </p:cNvSpPr>
-          <p:nvPr>
-            <p:ph type="sldNum" sz="quarter" idx="10"/>
-          </p:nvPr>
-        </p:nvSpPr>
-        <p:spPr/>
-        <p:txBody>
-          <a:bodyPr/>
-          <a:lstStyle/>
-          <a:p>
-            <a:fld id="{F7021451-1387-4CA6-816F-3879F97B5CBC}" type="slidenum">
-              <a:rPr lang="en-US"/>
-              <a:t>49</a:t>
-            </a:fld>
-            <a:endParaRPr lang="en-US"/>
-          </a:p>
-        </p:txBody>
-      </p:sp>
-    </p:spTree>
-    <p:extLst>
-      <p:ext uri="{BB962C8B-B14F-4D97-AF65-F5344CB8AC3E}">
-        <p14:creationId xmlns:p14="http://schemas.microsoft.com/office/powerpoint/2010/main" val="1024086991"/>
-      </p:ext>
-    </p:extLst>
-  </p:cSld>
-  <p:clrMapOvr>
-    <a:masterClrMapping/>
-  </p:clrMapOvr>
-</p:notes>
-</file>
-
-<file path=ppt/notesSlides/notesSlide5.xml><?xml version="1.0" encoding="utf-8"?>
-<p:notes xmlns:a="http://schemas.openxmlformats.org/drawingml/2006/main" xmlns:r="http://schemas.openxmlformats.org/officeDocument/2006/relationships" xmlns:p="http://schemas.openxmlformats.org/presentationml/2006/main">
-  <p:cSld>
-    <p:spTree>
-      <p:nvGrpSpPr>
-        <p:cNvPr id="1" name=""/>
-        <p:cNvGrpSpPr/>
-        <p:nvPr/>
-      </p:nvGrpSpPr>
-      <p:grpSpPr>
-        <a:xfrm>
-          <a:off x="0" y="0"/>
-          <a:ext cx="0" cy="0"/>
-          <a:chOff x="0" y="0"/>
-          <a:chExt cx="0" cy="0"/>
-        </a:xfrm>
-      </p:grpSpPr>
-      <p:sp>
-        <p:nvSpPr>
-          <p:cNvPr id="2" name="Slide Image Placeholder 1"/>
-          <p:cNvSpPr>
-            <a:spLocks noGrp="1" noRot="1" noChangeAspect="1"/>
-          </p:cNvSpPr>
-          <p:nvPr>
-            <p:ph type="sldImg"/>
-          </p:nvPr>
-        </p:nvSpPr>
-        <p:spPr/>
-      </p:sp>
-      <p:sp>
-        <p:nvSpPr>
-          <p:cNvPr id="3" name="Notes Placeholder 2"/>
-          <p:cNvSpPr>
-            <a:spLocks noGrp="1"/>
-          </p:cNvSpPr>
-          <p:nvPr>
-            <p:ph type="body" idx="1"/>
-          </p:nvPr>
-        </p:nvSpPr>
-        <p:spPr/>
-        <p:txBody>
-          <a:bodyPr/>
-          <a:lstStyle/>
-          <a:p>
-            <a:r>
-              <a:rPr lang="en-US" dirty="0"/>
-              <a:t/>
-            </a:r>
-            <a:endParaRPr lang="en-US" dirty="0"/>
-          </a:p>
-        </p:txBody>
-      </p:sp>
-      <p:sp>
-        <p:nvSpPr>
-          <p:cNvPr id="4" name="Slide Number Placeholder 3"/>
-          <p:cNvSpPr>
-            <a:spLocks noGrp="1"/>
-          </p:cNvSpPr>
-          <p:nvPr>
-            <p:ph type="sldNum" sz="quarter" idx="10"/>
-          </p:nvPr>
-        </p:nvSpPr>
-        <p:spPr/>
-        <p:txBody>
-          <a:bodyPr/>
-          <a:lstStyle/>
-          <a:p>
-            <a:fld id="{F7021451-1387-4CA6-816F-3879F97B5CBC}" type="slidenum">
-              <a:rPr lang="en-US"/>
               <a:t>5</a:t>
-            </a:fld>
-            <a:endParaRPr lang="en-US"/>
-          </a:p>
-        </p:txBody>
-      </p:sp>
-    </p:spTree>
-    <p:extLst>
-      <p:ext uri="{BB962C8B-B14F-4D97-AF65-F5344CB8AC3E}">
-        <p14:creationId xmlns:p14="http://schemas.microsoft.com/office/powerpoint/2010/main" val="1024086991"/>
-      </p:ext>
-    </p:extLst>
-  </p:cSld>
-  <p:clrMapOvr>
-    <a:masterClrMapping/>
-  </p:clrMapOvr>
-</p:notes>
-</file>
-
-<file path=ppt/notesSlides/notesSlide50.xml><?xml version="1.0" encoding="utf-8"?>
-<p:notes xmlns:a="http://schemas.openxmlformats.org/drawingml/2006/main" xmlns:r="http://schemas.openxmlformats.org/officeDocument/2006/relationships" xmlns:p="http://schemas.openxmlformats.org/presentationml/2006/main">
-  <p:cSld>
-    <p:spTree>
-      <p:nvGrpSpPr>
-        <p:cNvPr id="1" name=""/>
-        <p:cNvGrpSpPr/>
-        <p:nvPr/>
-      </p:nvGrpSpPr>
-      <p:grpSpPr>
-        <a:xfrm>
-          <a:off x="0" y="0"/>
-          <a:ext cx="0" cy="0"/>
-          <a:chOff x="0" y="0"/>
-          <a:chExt cx="0" cy="0"/>
-        </a:xfrm>
-      </p:grpSpPr>
-      <p:sp>
-        <p:nvSpPr>
-          <p:cNvPr id="2" name="Slide Image Placeholder 1"/>
-          <p:cNvSpPr>
-            <a:spLocks noGrp="1" noRot="1" noChangeAspect="1"/>
-          </p:cNvSpPr>
-          <p:nvPr>
-            <p:ph type="sldImg"/>
-          </p:nvPr>
-        </p:nvSpPr>
-        <p:spPr/>
-      </p:sp>
-      <p:sp>
-        <p:nvSpPr>
-          <p:cNvPr id="3" name="Notes Placeholder 2"/>
-          <p:cNvSpPr>
-            <a:spLocks noGrp="1"/>
-          </p:cNvSpPr>
-          <p:nvPr>
-            <p:ph type="body" idx="1"/>
-          </p:nvPr>
-        </p:nvSpPr>
-        <p:spPr/>
-        <p:txBody>
-          <a:bodyPr/>
-          <a:lstStyle/>
-          <a:p>
-            <a:r>
-              <a:rPr lang="en-US" dirty="0"/>
-              <a:t/>
-            </a:r>
-            <a:endParaRPr lang="en-US" dirty="0"/>
-          </a:p>
-        </p:txBody>
-      </p:sp>
-      <p:sp>
-        <p:nvSpPr>
-          <p:cNvPr id="4" name="Slide Number Placeholder 3"/>
-          <p:cNvSpPr>
-            <a:spLocks noGrp="1"/>
-          </p:cNvSpPr>
-          <p:nvPr>
-            <p:ph type="sldNum" sz="quarter" idx="10"/>
-          </p:nvPr>
-        </p:nvSpPr>
-        <p:spPr/>
-        <p:txBody>
-          <a:bodyPr/>
-          <a:lstStyle/>
-          <a:p>
-            <a:fld id="{F7021451-1387-4CA6-816F-3879F97B5CBC}" type="slidenum">
-              <a:rPr lang="en-US"/>
-              <a:t>50</a:t>
-            </a:fld>
-            <a:endParaRPr lang="en-US"/>
-          </a:p>
-        </p:txBody>
-      </p:sp>
-    </p:spTree>
-    <p:extLst>
-      <p:ext uri="{BB962C8B-B14F-4D97-AF65-F5344CB8AC3E}">
-        <p14:creationId xmlns:p14="http://schemas.microsoft.com/office/powerpoint/2010/main" val="1024086991"/>
-      </p:ext>
-    </p:extLst>
-  </p:cSld>
-  <p:clrMapOvr>
-    <a:masterClrMapping/>
-  </p:clrMapOvr>
-</p:notes>
-</file>
-
-<file path=ppt/notesSlides/notesSlide51.xml><?xml version="1.0" encoding="utf-8"?>
-<p:notes xmlns:a="http://schemas.openxmlformats.org/drawingml/2006/main" xmlns:r="http://schemas.openxmlformats.org/officeDocument/2006/relationships" xmlns:p="http://schemas.openxmlformats.org/presentationml/2006/main">
-  <p:cSld>
-    <p:spTree>
-      <p:nvGrpSpPr>
-        <p:cNvPr id="1" name=""/>
-        <p:cNvGrpSpPr/>
-        <p:nvPr/>
-      </p:nvGrpSpPr>
-      <p:grpSpPr>
-        <a:xfrm>
-          <a:off x="0" y="0"/>
-          <a:ext cx="0" cy="0"/>
-          <a:chOff x="0" y="0"/>
-          <a:chExt cx="0" cy="0"/>
-        </a:xfrm>
-      </p:grpSpPr>
-      <p:sp>
-        <p:nvSpPr>
-          <p:cNvPr id="2" name="Slide Image Placeholder 1"/>
-          <p:cNvSpPr>
-            <a:spLocks noGrp="1" noRot="1" noChangeAspect="1"/>
-          </p:cNvSpPr>
-          <p:nvPr>
-            <p:ph type="sldImg"/>
-          </p:nvPr>
-        </p:nvSpPr>
-        <p:spPr/>
-      </p:sp>
-      <p:sp>
-        <p:nvSpPr>
-          <p:cNvPr id="3" name="Notes Placeholder 2"/>
-          <p:cNvSpPr>
-            <a:spLocks noGrp="1"/>
-          </p:cNvSpPr>
-          <p:nvPr>
-            <p:ph type="body" idx="1"/>
-          </p:nvPr>
-        </p:nvSpPr>
-        <p:spPr/>
-        <p:txBody>
-          <a:bodyPr/>
-          <a:lstStyle/>
-          <a:p>
-            <a:r>
-              <a:rPr lang="en-US" dirty="0"/>
-              <a:t/>
-            </a:r>
-            <a:endParaRPr lang="en-US" dirty="0"/>
-          </a:p>
-        </p:txBody>
-      </p:sp>
-      <p:sp>
-        <p:nvSpPr>
-          <p:cNvPr id="4" name="Slide Number Placeholder 3"/>
-          <p:cNvSpPr>
-            <a:spLocks noGrp="1"/>
-          </p:cNvSpPr>
-          <p:nvPr>
-            <p:ph type="sldNum" sz="quarter" idx="10"/>
-          </p:nvPr>
-        </p:nvSpPr>
-        <p:spPr/>
-        <p:txBody>
-          <a:bodyPr/>
-          <a:lstStyle/>
-          <a:p>
-            <a:fld id="{F7021451-1387-4CA6-816F-3879F97B5CBC}" type="slidenum">
-              <a:rPr lang="en-US"/>
-              <a:t>51</a:t>
             </a:fld>
             <a:endParaRPr lang="en-US"/>
           </a:p>
@@ -6003,162 +3689,6 @@
 </p:sld>
 </file>
 
-<file path=ppt/slides/slide26.xml><?xml version="1.0" encoding="utf-8"?>
-<p:sld xmlns:a="http://schemas.openxmlformats.org/drawingml/2006/main" xmlns:r="http://schemas.openxmlformats.org/officeDocument/2006/relationships" xmlns:p="http://schemas.openxmlformats.org/presentationml/2006/main">
-  <p:cSld name="Slide 26">
-    <p:bg>
-      <p:bgPr>
-        <a:blipFill dpi="0" rotWithShape="1">
-          <a:blip r:embed="rId1">
-            <a:lum/>
-          </a:blip>
-          <a:srcRect/>
-          <a:stretch>
-            <a:fillRect/>
-          </a:stretch>
-        </a:blipFill>
-        <a:effectLst/>
-      </p:bgPr>
-    </p:bg>
-    <p:spTree>
-      <p:nvGrpSpPr>
-        <p:cNvPr id="1" name=""/>
-        <p:cNvGrpSpPr/>
-        <p:nvPr/>
-      </p:nvGrpSpPr>
-      <p:grpSpPr>
-        <a:xfrm>
-          <a:off x="0" y="0"/>
-          <a:ext cx="0" cy="0"/>
-          <a:chOff x="0" y="0"/>
-          <a:chExt cx="0" cy="0"/>
-        </a:xfrm>
-      </p:grpSpPr>
-    </p:spTree>
-  </p:cSld>
-  <p:clrMapOvr>
-    <a:masterClrMapping/>
-  </p:clrMapOvr>
-</p:sld>
-</file>
-
-<file path=ppt/slides/slide27.xml><?xml version="1.0" encoding="utf-8"?>
-<p:sld xmlns:a="http://schemas.openxmlformats.org/drawingml/2006/main" xmlns:r="http://schemas.openxmlformats.org/officeDocument/2006/relationships" xmlns:p="http://schemas.openxmlformats.org/presentationml/2006/main">
-  <p:cSld name="Slide 27">
-    <p:bg>
-      <p:bgPr>
-        <a:blipFill dpi="0" rotWithShape="1">
-          <a:blip r:embed="rId1">
-            <a:lum/>
-          </a:blip>
-          <a:srcRect/>
-          <a:stretch>
-            <a:fillRect/>
-          </a:stretch>
-        </a:blipFill>
-        <a:effectLst/>
-      </p:bgPr>
-    </p:bg>
-    <p:spTree>
-      <p:nvGrpSpPr>
-        <p:cNvPr id="1" name=""/>
-        <p:cNvGrpSpPr/>
-        <p:nvPr/>
-      </p:nvGrpSpPr>
-      <p:grpSpPr>
-        <a:xfrm>
-          <a:off x="0" y="0"/>
-          <a:ext cx="0" cy="0"/>
-          <a:chOff x="0" y="0"/>
-          <a:chExt cx="0" cy="0"/>
-        </a:xfrm>
-      </p:grpSpPr>
-    </p:spTree>
-  </p:cSld>
-  <p:clrMapOvr>
-    <a:masterClrMapping/>
-  </p:clrMapOvr>
-</p:sld>
-</file>
-
-<file path=ppt/slides/slide28.xml><?xml version="1.0" encoding="utf-8"?>
-<p:sld xmlns:a="http://schemas.openxmlformats.org/drawingml/2006/main" xmlns:r="http://schemas.openxmlformats.org/officeDocument/2006/relationships" xmlns:p="http://schemas.openxmlformats.org/presentationml/2006/main">
-  <p:cSld name="Slide 28">
-    <p:bg>
-      <p:bgPr>
-        <a:blipFill dpi="0" rotWithShape="1">
-          <a:blip r:embed="rId1">
-            <a:lum/>
-          </a:blip>
-          <a:srcRect/>
-          <a:stretch>
-            <a:fillRect/>
-          </a:stretch>
-        </a:blipFill>
-        <a:effectLst/>
-      </p:bgPr>
-    </p:bg>
-    <p:spTree>
-      <p:nvGrpSpPr>
-        <p:cNvPr id="1" name=""/>
-        <p:cNvGrpSpPr/>
-        <p:nvPr/>
-      </p:nvGrpSpPr>
-      <p:grpSpPr>
-        <a:xfrm>
-          <a:off x="0" y="0"/>
-          <a:ext cx="0" cy="0"/>
-          <a:chOff x="0" y="0"/>
-          <a:chExt cx="0" cy="0"/>
-        </a:xfrm>
-      </p:grpSpPr>
-    </p:spTree>
-  </p:cSld>
-  <p:clrMapOvr>
-    <a:masterClrMapping/>
-  </p:clrMapOvr>
-</p:sld>
-</file>
-
-<file path=ppt/slides/slide29.xml><?xml version="1.0" encoding="utf-8"?>
-<p:sld xmlns:a="http://schemas.openxmlformats.org/drawingml/2006/main" xmlns:r="http://schemas.openxmlformats.org/officeDocument/2006/relationships" xmlns:p="http://schemas.openxmlformats.org/presentationml/2006/main">
-  <p:cSld name="Slide 29">
-    <p:bg>
-      <p:bgPr>
-        <a:blipFill dpi="0" rotWithShape="1">
-          <a:blip r:embed="rId1">
-            <a:lum/>
-          </a:blip>
-          <a:srcRect/>
-          <a:stretch>
-            <a:fillRect/>
-          </a:stretch>
-        </a:blipFill>
-        <a:effectLst/>
-      </p:bgPr>
-    </p:bg>
-    <p:spTree>
-      <p:nvGrpSpPr>
-        <p:cNvPr id="1" name=""/>
-        <p:cNvGrpSpPr/>
-        <p:nvPr/>
-      </p:nvGrpSpPr>
-      <p:grpSpPr>
-        <a:xfrm>
-          <a:off x="0" y="0"/>
-          <a:ext cx="0" cy="0"/>
-          <a:chOff x="0" y="0"/>
-          <a:chExt cx="0" cy="0"/>
-        </a:xfrm>
-      </p:grpSpPr>
-    </p:spTree>
-  </p:cSld>
-  <p:clrMapOvr>
-    <a:masterClrMapping/>
-  </p:clrMapOvr>
-</p:sld>
-</file>
-
 <file path=ppt/slides/slide3.xml><?xml version="1.0" encoding="utf-8"?>
 <p:sld xmlns:a="http://schemas.openxmlformats.org/drawingml/2006/main" xmlns:r="http://schemas.openxmlformats.org/officeDocument/2006/relationships" xmlns:p="http://schemas.openxmlformats.org/presentationml/2006/main">
   <p:cSld name="Slide 3">
@@ -6198,396 +3728,6 @@
 </p:sld>
 </file>
 
-<file path=ppt/slides/slide30.xml><?xml version="1.0" encoding="utf-8"?>
-<p:sld xmlns:a="http://schemas.openxmlformats.org/drawingml/2006/main" xmlns:r="http://schemas.openxmlformats.org/officeDocument/2006/relationships" xmlns:p="http://schemas.openxmlformats.org/presentationml/2006/main">
-  <p:cSld name="Slide 30">
-    <p:bg>
-      <p:bgPr>
-        <a:blipFill dpi="0" rotWithShape="1">
-          <a:blip r:embed="rId1">
-            <a:lum/>
-          </a:blip>
-          <a:srcRect/>
-          <a:stretch>
-            <a:fillRect/>
-          </a:stretch>
-        </a:blipFill>
-        <a:effectLst/>
-      </p:bgPr>
-    </p:bg>
-    <p:spTree>
-      <p:nvGrpSpPr>
-        <p:cNvPr id="1" name=""/>
-        <p:cNvGrpSpPr/>
-        <p:nvPr/>
-      </p:nvGrpSpPr>
-      <p:grpSpPr>
-        <a:xfrm>
-          <a:off x="0" y="0"/>
-          <a:ext cx="0" cy="0"/>
-          <a:chOff x="0" y="0"/>
-          <a:chExt cx="0" cy="0"/>
-        </a:xfrm>
-      </p:grpSpPr>
-    </p:spTree>
-  </p:cSld>
-  <p:clrMapOvr>
-    <a:masterClrMapping/>
-  </p:clrMapOvr>
-</p:sld>
-</file>
-
-<file path=ppt/slides/slide31.xml><?xml version="1.0" encoding="utf-8"?>
-<p:sld xmlns:a="http://schemas.openxmlformats.org/drawingml/2006/main" xmlns:r="http://schemas.openxmlformats.org/officeDocument/2006/relationships" xmlns:p="http://schemas.openxmlformats.org/presentationml/2006/main">
-  <p:cSld name="Slide 31">
-    <p:bg>
-      <p:bgPr>
-        <a:blipFill dpi="0" rotWithShape="1">
-          <a:blip r:embed="rId1">
-            <a:lum/>
-          </a:blip>
-          <a:srcRect/>
-          <a:stretch>
-            <a:fillRect/>
-          </a:stretch>
-        </a:blipFill>
-        <a:effectLst/>
-      </p:bgPr>
-    </p:bg>
-    <p:spTree>
-      <p:nvGrpSpPr>
-        <p:cNvPr id="1" name=""/>
-        <p:cNvGrpSpPr/>
-        <p:nvPr/>
-      </p:nvGrpSpPr>
-      <p:grpSpPr>
-        <a:xfrm>
-          <a:off x="0" y="0"/>
-          <a:ext cx="0" cy="0"/>
-          <a:chOff x="0" y="0"/>
-          <a:chExt cx="0" cy="0"/>
-        </a:xfrm>
-      </p:grpSpPr>
-    </p:spTree>
-  </p:cSld>
-  <p:clrMapOvr>
-    <a:masterClrMapping/>
-  </p:clrMapOvr>
-</p:sld>
-</file>
-
-<file path=ppt/slides/slide32.xml><?xml version="1.0" encoding="utf-8"?>
-<p:sld xmlns:a="http://schemas.openxmlformats.org/drawingml/2006/main" xmlns:r="http://schemas.openxmlformats.org/officeDocument/2006/relationships" xmlns:p="http://schemas.openxmlformats.org/presentationml/2006/main">
-  <p:cSld name="Slide 32">
-    <p:bg>
-      <p:bgPr>
-        <a:blipFill dpi="0" rotWithShape="1">
-          <a:blip r:embed="rId1">
-            <a:lum/>
-          </a:blip>
-          <a:srcRect/>
-          <a:stretch>
-            <a:fillRect/>
-          </a:stretch>
-        </a:blipFill>
-        <a:effectLst/>
-      </p:bgPr>
-    </p:bg>
-    <p:spTree>
-      <p:nvGrpSpPr>
-        <p:cNvPr id="1" name=""/>
-        <p:cNvGrpSpPr/>
-        <p:nvPr/>
-      </p:nvGrpSpPr>
-      <p:grpSpPr>
-        <a:xfrm>
-          <a:off x="0" y="0"/>
-          <a:ext cx="0" cy="0"/>
-          <a:chOff x="0" y="0"/>
-          <a:chExt cx="0" cy="0"/>
-        </a:xfrm>
-      </p:grpSpPr>
-    </p:spTree>
-  </p:cSld>
-  <p:clrMapOvr>
-    <a:masterClrMapping/>
-  </p:clrMapOvr>
-</p:sld>
-</file>
-
-<file path=ppt/slides/slide33.xml><?xml version="1.0" encoding="utf-8"?>
-<p:sld xmlns:a="http://schemas.openxmlformats.org/drawingml/2006/main" xmlns:r="http://schemas.openxmlformats.org/officeDocument/2006/relationships" xmlns:p="http://schemas.openxmlformats.org/presentationml/2006/main">
-  <p:cSld name="Slide 33">
-    <p:bg>
-      <p:bgPr>
-        <a:blipFill dpi="0" rotWithShape="1">
-          <a:blip r:embed="rId1">
-            <a:lum/>
-          </a:blip>
-          <a:srcRect/>
-          <a:stretch>
-            <a:fillRect/>
-          </a:stretch>
-        </a:blipFill>
-        <a:effectLst/>
-      </p:bgPr>
-    </p:bg>
-    <p:spTree>
-      <p:nvGrpSpPr>
-        <p:cNvPr id="1" name=""/>
-        <p:cNvGrpSpPr/>
-        <p:nvPr/>
-      </p:nvGrpSpPr>
-      <p:grpSpPr>
-        <a:xfrm>
-          <a:off x="0" y="0"/>
-          <a:ext cx="0" cy="0"/>
-          <a:chOff x="0" y="0"/>
-          <a:chExt cx="0" cy="0"/>
-        </a:xfrm>
-      </p:grpSpPr>
-    </p:spTree>
-  </p:cSld>
-  <p:clrMapOvr>
-    <a:masterClrMapping/>
-  </p:clrMapOvr>
-</p:sld>
-</file>
-
-<file path=ppt/slides/slide34.xml><?xml version="1.0" encoding="utf-8"?>
-<p:sld xmlns:a="http://schemas.openxmlformats.org/drawingml/2006/main" xmlns:r="http://schemas.openxmlformats.org/officeDocument/2006/relationships" xmlns:p="http://schemas.openxmlformats.org/presentationml/2006/main">
-  <p:cSld name="Slide 34">
-    <p:bg>
-      <p:bgPr>
-        <a:blipFill dpi="0" rotWithShape="1">
-          <a:blip r:embed="rId1">
-            <a:lum/>
-          </a:blip>
-          <a:srcRect/>
-          <a:stretch>
-            <a:fillRect/>
-          </a:stretch>
-        </a:blipFill>
-        <a:effectLst/>
-      </p:bgPr>
-    </p:bg>
-    <p:spTree>
-      <p:nvGrpSpPr>
-        <p:cNvPr id="1" name=""/>
-        <p:cNvGrpSpPr/>
-        <p:nvPr/>
-      </p:nvGrpSpPr>
-      <p:grpSpPr>
-        <a:xfrm>
-          <a:off x="0" y="0"/>
-          <a:ext cx="0" cy="0"/>
-          <a:chOff x="0" y="0"/>
-          <a:chExt cx="0" cy="0"/>
-        </a:xfrm>
-      </p:grpSpPr>
-    </p:spTree>
-  </p:cSld>
-  <p:clrMapOvr>
-    <a:masterClrMapping/>
-  </p:clrMapOvr>
-</p:sld>
-</file>
-
-<file path=ppt/slides/slide35.xml><?xml version="1.0" encoding="utf-8"?>
-<p:sld xmlns:a="http://schemas.openxmlformats.org/drawingml/2006/main" xmlns:r="http://schemas.openxmlformats.org/officeDocument/2006/relationships" xmlns:p="http://schemas.openxmlformats.org/presentationml/2006/main">
-  <p:cSld name="Slide 35">
-    <p:bg>
-      <p:bgPr>
-        <a:blipFill dpi="0" rotWithShape="1">
-          <a:blip r:embed="rId1">
-            <a:lum/>
-          </a:blip>
-          <a:srcRect/>
-          <a:stretch>
-            <a:fillRect/>
-          </a:stretch>
-        </a:blipFill>
-        <a:effectLst/>
-      </p:bgPr>
-    </p:bg>
-    <p:spTree>
-      <p:nvGrpSpPr>
-        <p:cNvPr id="1" name=""/>
-        <p:cNvGrpSpPr/>
-        <p:nvPr/>
-      </p:nvGrpSpPr>
-      <p:grpSpPr>
-        <a:xfrm>
-          <a:off x="0" y="0"/>
-          <a:ext cx="0" cy="0"/>
-          <a:chOff x="0" y="0"/>
-          <a:chExt cx="0" cy="0"/>
-        </a:xfrm>
-      </p:grpSpPr>
-    </p:spTree>
-  </p:cSld>
-  <p:clrMapOvr>
-    <a:masterClrMapping/>
-  </p:clrMapOvr>
-</p:sld>
-</file>
-
-<file path=ppt/slides/slide36.xml><?xml version="1.0" encoding="utf-8"?>
-<p:sld xmlns:a="http://schemas.openxmlformats.org/drawingml/2006/main" xmlns:r="http://schemas.openxmlformats.org/officeDocument/2006/relationships" xmlns:p="http://schemas.openxmlformats.org/presentationml/2006/main">
-  <p:cSld name="Slide 36">
-    <p:bg>
-      <p:bgPr>
-        <a:blipFill dpi="0" rotWithShape="1">
-          <a:blip r:embed="rId1">
-            <a:lum/>
-          </a:blip>
-          <a:srcRect/>
-          <a:stretch>
-            <a:fillRect/>
-          </a:stretch>
-        </a:blipFill>
-        <a:effectLst/>
-      </p:bgPr>
-    </p:bg>
-    <p:spTree>
-      <p:nvGrpSpPr>
-        <p:cNvPr id="1" name=""/>
-        <p:cNvGrpSpPr/>
-        <p:nvPr/>
-      </p:nvGrpSpPr>
-      <p:grpSpPr>
-        <a:xfrm>
-          <a:off x="0" y="0"/>
-          <a:ext cx="0" cy="0"/>
-          <a:chOff x="0" y="0"/>
-          <a:chExt cx="0" cy="0"/>
-        </a:xfrm>
-      </p:grpSpPr>
-    </p:spTree>
-  </p:cSld>
-  <p:clrMapOvr>
-    <a:masterClrMapping/>
-  </p:clrMapOvr>
-</p:sld>
-</file>
-
-<file path=ppt/slides/slide37.xml><?xml version="1.0" encoding="utf-8"?>
-<p:sld xmlns:a="http://schemas.openxmlformats.org/drawingml/2006/main" xmlns:r="http://schemas.openxmlformats.org/officeDocument/2006/relationships" xmlns:p="http://schemas.openxmlformats.org/presentationml/2006/main">
-  <p:cSld name="Slide 37">
-    <p:bg>
-      <p:bgPr>
-        <a:blipFill dpi="0" rotWithShape="1">
-          <a:blip r:embed="rId1">
-            <a:lum/>
-          </a:blip>
-          <a:srcRect/>
-          <a:stretch>
-            <a:fillRect/>
-          </a:stretch>
-        </a:blipFill>
-        <a:effectLst/>
-      </p:bgPr>
-    </p:bg>
-    <p:spTree>
-      <p:nvGrpSpPr>
-        <p:cNvPr id="1" name=""/>
-        <p:cNvGrpSpPr/>
-        <p:nvPr/>
-      </p:nvGrpSpPr>
-      <p:grpSpPr>
-        <a:xfrm>
-          <a:off x="0" y="0"/>
-          <a:ext cx="0" cy="0"/>
-          <a:chOff x="0" y="0"/>
-          <a:chExt cx="0" cy="0"/>
-        </a:xfrm>
-      </p:grpSpPr>
-    </p:spTree>
-  </p:cSld>
-  <p:clrMapOvr>
-    <a:masterClrMapping/>
-  </p:clrMapOvr>
-</p:sld>
-</file>
-
-<file path=ppt/slides/slide38.xml><?xml version="1.0" encoding="utf-8"?>
-<p:sld xmlns:a="http://schemas.openxmlformats.org/drawingml/2006/main" xmlns:r="http://schemas.openxmlformats.org/officeDocument/2006/relationships" xmlns:p="http://schemas.openxmlformats.org/presentationml/2006/main">
-  <p:cSld name="Slide 38">
-    <p:bg>
-      <p:bgPr>
-        <a:blipFill dpi="0" rotWithShape="1">
-          <a:blip r:embed="rId1">
-            <a:lum/>
-          </a:blip>
-          <a:srcRect/>
-          <a:stretch>
-            <a:fillRect/>
-          </a:stretch>
-        </a:blipFill>
-        <a:effectLst/>
-      </p:bgPr>
-    </p:bg>
-    <p:spTree>
-      <p:nvGrpSpPr>
-        <p:cNvPr id="1" name=""/>
-        <p:cNvGrpSpPr/>
-        <p:nvPr/>
-      </p:nvGrpSpPr>
-      <p:grpSpPr>
-        <a:xfrm>
-          <a:off x="0" y="0"/>
-          <a:ext cx="0" cy="0"/>
-          <a:chOff x="0" y="0"/>
-          <a:chExt cx="0" cy="0"/>
-        </a:xfrm>
-      </p:grpSpPr>
-    </p:spTree>
-  </p:cSld>
-  <p:clrMapOvr>
-    <a:masterClrMapping/>
-  </p:clrMapOvr>
-</p:sld>
-</file>
-
-<file path=ppt/slides/slide39.xml><?xml version="1.0" encoding="utf-8"?>
-<p:sld xmlns:a="http://schemas.openxmlformats.org/drawingml/2006/main" xmlns:r="http://schemas.openxmlformats.org/officeDocument/2006/relationships" xmlns:p="http://schemas.openxmlformats.org/presentationml/2006/main">
-  <p:cSld name="Slide 39">
-    <p:bg>
-      <p:bgPr>
-        <a:blipFill dpi="0" rotWithShape="1">
-          <a:blip r:embed="rId1">
-            <a:lum/>
-          </a:blip>
-          <a:srcRect/>
-          <a:stretch>
-            <a:fillRect/>
-          </a:stretch>
-        </a:blipFill>
-        <a:effectLst/>
-      </p:bgPr>
-    </p:bg>
-    <p:spTree>
-      <p:nvGrpSpPr>
-        <p:cNvPr id="1" name=""/>
-        <p:cNvGrpSpPr/>
-        <p:nvPr/>
-      </p:nvGrpSpPr>
-      <p:grpSpPr>
-        <a:xfrm>
-          <a:off x="0" y="0"/>
-          <a:ext cx="0" cy="0"/>
-          <a:chOff x="0" y="0"/>
-          <a:chExt cx="0" cy="0"/>
-        </a:xfrm>
-      </p:grpSpPr>
-    </p:spTree>
-  </p:cSld>
-  <p:clrMapOvr>
-    <a:masterClrMapping/>
-  </p:clrMapOvr>
-</p:sld>
-</file>
-
 <file path=ppt/slides/slide4.xml><?xml version="1.0" encoding="utf-8"?>
 <p:sld xmlns:a="http://schemas.openxmlformats.org/drawingml/2006/main" xmlns:r="http://schemas.openxmlformats.org/officeDocument/2006/relationships" xmlns:p="http://schemas.openxmlformats.org/presentationml/2006/main">
   <p:cSld name="Slide 4">
@@ -6627,477 +3767,9 @@
 </p:sld>
 </file>
 
-<file path=ppt/slides/slide40.xml><?xml version="1.0" encoding="utf-8"?>
-<p:sld xmlns:a="http://schemas.openxmlformats.org/drawingml/2006/main" xmlns:r="http://schemas.openxmlformats.org/officeDocument/2006/relationships" xmlns:p="http://schemas.openxmlformats.org/presentationml/2006/main">
-  <p:cSld name="Slide 40">
-    <p:bg>
-      <p:bgPr>
-        <a:blipFill dpi="0" rotWithShape="1">
-          <a:blip r:embed="rId1">
-            <a:lum/>
-          </a:blip>
-          <a:srcRect/>
-          <a:stretch>
-            <a:fillRect/>
-          </a:stretch>
-        </a:blipFill>
-        <a:effectLst/>
-      </p:bgPr>
-    </p:bg>
-    <p:spTree>
-      <p:nvGrpSpPr>
-        <p:cNvPr id="1" name=""/>
-        <p:cNvGrpSpPr/>
-        <p:nvPr/>
-      </p:nvGrpSpPr>
-      <p:grpSpPr>
-        <a:xfrm>
-          <a:off x="0" y="0"/>
-          <a:ext cx="0" cy="0"/>
-          <a:chOff x="0" y="0"/>
-          <a:chExt cx="0" cy="0"/>
-        </a:xfrm>
-      </p:grpSpPr>
-    </p:spTree>
-  </p:cSld>
-  <p:clrMapOvr>
-    <a:masterClrMapping/>
-  </p:clrMapOvr>
-</p:sld>
-</file>
-
-<file path=ppt/slides/slide41.xml><?xml version="1.0" encoding="utf-8"?>
-<p:sld xmlns:a="http://schemas.openxmlformats.org/drawingml/2006/main" xmlns:r="http://schemas.openxmlformats.org/officeDocument/2006/relationships" xmlns:p="http://schemas.openxmlformats.org/presentationml/2006/main">
-  <p:cSld name="Slide 41">
-    <p:bg>
-      <p:bgPr>
-        <a:blipFill dpi="0" rotWithShape="1">
-          <a:blip r:embed="rId1">
-            <a:lum/>
-          </a:blip>
-          <a:srcRect/>
-          <a:stretch>
-            <a:fillRect/>
-          </a:stretch>
-        </a:blipFill>
-        <a:effectLst/>
-      </p:bgPr>
-    </p:bg>
-    <p:spTree>
-      <p:nvGrpSpPr>
-        <p:cNvPr id="1" name=""/>
-        <p:cNvGrpSpPr/>
-        <p:nvPr/>
-      </p:nvGrpSpPr>
-      <p:grpSpPr>
-        <a:xfrm>
-          <a:off x="0" y="0"/>
-          <a:ext cx="0" cy="0"/>
-          <a:chOff x="0" y="0"/>
-          <a:chExt cx="0" cy="0"/>
-        </a:xfrm>
-      </p:grpSpPr>
-    </p:spTree>
-  </p:cSld>
-  <p:clrMapOvr>
-    <a:masterClrMapping/>
-  </p:clrMapOvr>
-</p:sld>
-</file>
-
-<file path=ppt/slides/slide42.xml><?xml version="1.0" encoding="utf-8"?>
-<p:sld xmlns:a="http://schemas.openxmlformats.org/drawingml/2006/main" xmlns:r="http://schemas.openxmlformats.org/officeDocument/2006/relationships" xmlns:p="http://schemas.openxmlformats.org/presentationml/2006/main">
-  <p:cSld name="Slide 42">
-    <p:bg>
-      <p:bgPr>
-        <a:blipFill dpi="0" rotWithShape="1">
-          <a:blip r:embed="rId1">
-            <a:lum/>
-          </a:blip>
-          <a:srcRect/>
-          <a:stretch>
-            <a:fillRect/>
-          </a:stretch>
-        </a:blipFill>
-        <a:effectLst/>
-      </p:bgPr>
-    </p:bg>
-    <p:spTree>
-      <p:nvGrpSpPr>
-        <p:cNvPr id="1" name=""/>
-        <p:cNvGrpSpPr/>
-        <p:nvPr/>
-      </p:nvGrpSpPr>
-      <p:grpSpPr>
-        <a:xfrm>
-          <a:off x="0" y="0"/>
-          <a:ext cx="0" cy="0"/>
-          <a:chOff x="0" y="0"/>
-          <a:chExt cx="0" cy="0"/>
-        </a:xfrm>
-      </p:grpSpPr>
-    </p:spTree>
-  </p:cSld>
-  <p:clrMapOvr>
-    <a:masterClrMapping/>
-  </p:clrMapOvr>
-</p:sld>
-</file>
-
-<file path=ppt/slides/slide43.xml><?xml version="1.0" encoding="utf-8"?>
-<p:sld xmlns:a="http://schemas.openxmlformats.org/drawingml/2006/main" xmlns:r="http://schemas.openxmlformats.org/officeDocument/2006/relationships" xmlns:p="http://schemas.openxmlformats.org/presentationml/2006/main">
-  <p:cSld name="Slide 43">
-    <p:bg>
-      <p:bgPr>
-        <a:blipFill dpi="0" rotWithShape="1">
-          <a:blip r:embed="rId1">
-            <a:lum/>
-          </a:blip>
-          <a:srcRect/>
-          <a:stretch>
-            <a:fillRect/>
-          </a:stretch>
-        </a:blipFill>
-        <a:effectLst/>
-      </p:bgPr>
-    </p:bg>
-    <p:spTree>
-      <p:nvGrpSpPr>
-        <p:cNvPr id="1" name=""/>
-        <p:cNvGrpSpPr/>
-        <p:nvPr/>
-      </p:nvGrpSpPr>
-      <p:grpSpPr>
-        <a:xfrm>
-          <a:off x="0" y="0"/>
-          <a:ext cx="0" cy="0"/>
-          <a:chOff x="0" y="0"/>
-          <a:chExt cx="0" cy="0"/>
-        </a:xfrm>
-      </p:grpSpPr>
-    </p:spTree>
-  </p:cSld>
-  <p:clrMapOvr>
-    <a:masterClrMapping/>
-  </p:clrMapOvr>
-</p:sld>
-</file>
-
-<file path=ppt/slides/slide44.xml><?xml version="1.0" encoding="utf-8"?>
-<p:sld xmlns:a="http://schemas.openxmlformats.org/drawingml/2006/main" xmlns:r="http://schemas.openxmlformats.org/officeDocument/2006/relationships" xmlns:p="http://schemas.openxmlformats.org/presentationml/2006/main">
-  <p:cSld name="Slide 44">
-    <p:bg>
-      <p:bgPr>
-        <a:blipFill dpi="0" rotWithShape="1">
-          <a:blip r:embed="rId1">
-            <a:lum/>
-          </a:blip>
-          <a:srcRect/>
-          <a:stretch>
-            <a:fillRect/>
-          </a:stretch>
-        </a:blipFill>
-        <a:effectLst/>
-      </p:bgPr>
-    </p:bg>
-    <p:spTree>
-      <p:nvGrpSpPr>
-        <p:cNvPr id="1" name=""/>
-        <p:cNvGrpSpPr/>
-        <p:nvPr/>
-      </p:nvGrpSpPr>
-      <p:grpSpPr>
-        <a:xfrm>
-          <a:off x="0" y="0"/>
-          <a:ext cx="0" cy="0"/>
-          <a:chOff x="0" y="0"/>
-          <a:chExt cx="0" cy="0"/>
-        </a:xfrm>
-      </p:grpSpPr>
-    </p:spTree>
-  </p:cSld>
-  <p:clrMapOvr>
-    <a:masterClrMapping/>
-  </p:clrMapOvr>
-</p:sld>
-</file>
-
-<file path=ppt/slides/slide45.xml><?xml version="1.0" encoding="utf-8"?>
-<p:sld xmlns:a="http://schemas.openxmlformats.org/drawingml/2006/main" xmlns:r="http://schemas.openxmlformats.org/officeDocument/2006/relationships" xmlns:p="http://schemas.openxmlformats.org/presentationml/2006/main">
-  <p:cSld name="Slide 45">
-    <p:bg>
-      <p:bgPr>
-        <a:blipFill dpi="0" rotWithShape="1">
-          <a:blip r:embed="rId1">
-            <a:lum/>
-          </a:blip>
-          <a:srcRect/>
-          <a:stretch>
-            <a:fillRect/>
-          </a:stretch>
-        </a:blipFill>
-        <a:effectLst/>
-      </p:bgPr>
-    </p:bg>
-    <p:spTree>
-      <p:nvGrpSpPr>
-        <p:cNvPr id="1" name=""/>
-        <p:cNvGrpSpPr/>
-        <p:nvPr/>
-      </p:nvGrpSpPr>
-      <p:grpSpPr>
-        <a:xfrm>
-          <a:off x="0" y="0"/>
-          <a:ext cx="0" cy="0"/>
-          <a:chOff x="0" y="0"/>
-          <a:chExt cx="0" cy="0"/>
-        </a:xfrm>
-      </p:grpSpPr>
-    </p:spTree>
-  </p:cSld>
-  <p:clrMapOvr>
-    <a:masterClrMapping/>
-  </p:clrMapOvr>
-</p:sld>
-</file>
-
-<file path=ppt/slides/slide46.xml><?xml version="1.0" encoding="utf-8"?>
-<p:sld xmlns:a="http://schemas.openxmlformats.org/drawingml/2006/main" xmlns:r="http://schemas.openxmlformats.org/officeDocument/2006/relationships" xmlns:p="http://schemas.openxmlformats.org/presentationml/2006/main">
-  <p:cSld name="Slide 46">
-    <p:bg>
-      <p:bgPr>
-        <a:blipFill dpi="0" rotWithShape="1">
-          <a:blip r:embed="rId1">
-            <a:lum/>
-          </a:blip>
-          <a:srcRect/>
-          <a:stretch>
-            <a:fillRect/>
-          </a:stretch>
-        </a:blipFill>
-        <a:effectLst/>
-      </p:bgPr>
-    </p:bg>
-    <p:spTree>
-      <p:nvGrpSpPr>
-        <p:cNvPr id="1" name=""/>
-        <p:cNvGrpSpPr/>
-        <p:nvPr/>
-      </p:nvGrpSpPr>
-      <p:grpSpPr>
-        <a:xfrm>
-          <a:off x="0" y="0"/>
-          <a:ext cx="0" cy="0"/>
-          <a:chOff x="0" y="0"/>
-          <a:chExt cx="0" cy="0"/>
-        </a:xfrm>
-      </p:grpSpPr>
-    </p:spTree>
-  </p:cSld>
-  <p:clrMapOvr>
-    <a:masterClrMapping/>
-  </p:clrMapOvr>
-</p:sld>
-</file>
-
-<file path=ppt/slides/slide47.xml><?xml version="1.0" encoding="utf-8"?>
-<p:sld xmlns:a="http://schemas.openxmlformats.org/drawingml/2006/main" xmlns:r="http://schemas.openxmlformats.org/officeDocument/2006/relationships" xmlns:p="http://schemas.openxmlformats.org/presentationml/2006/main">
-  <p:cSld name="Slide 47">
-    <p:bg>
-      <p:bgPr>
-        <a:blipFill dpi="0" rotWithShape="1">
-          <a:blip r:embed="rId1">
-            <a:lum/>
-          </a:blip>
-          <a:srcRect/>
-          <a:stretch>
-            <a:fillRect/>
-          </a:stretch>
-        </a:blipFill>
-        <a:effectLst/>
-      </p:bgPr>
-    </p:bg>
-    <p:spTree>
-      <p:nvGrpSpPr>
-        <p:cNvPr id="1" name=""/>
-        <p:cNvGrpSpPr/>
-        <p:nvPr/>
-      </p:nvGrpSpPr>
-      <p:grpSpPr>
-        <a:xfrm>
-          <a:off x="0" y="0"/>
-          <a:ext cx="0" cy="0"/>
-          <a:chOff x="0" y="0"/>
-          <a:chExt cx="0" cy="0"/>
-        </a:xfrm>
-      </p:grpSpPr>
-    </p:spTree>
-  </p:cSld>
-  <p:clrMapOvr>
-    <a:masterClrMapping/>
-  </p:clrMapOvr>
-</p:sld>
-</file>
-
-<file path=ppt/slides/slide48.xml><?xml version="1.0" encoding="utf-8"?>
-<p:sld xmlns:a="http://schemas.openxmlformats.org/drawingml/2006/main" xmlns:r="http://schemas.openxmlformats.org/officeDocument/2006/relationships" xmlns:p="http://schemas.openxmlformats.org/presentationml/2006/main">
-  <p:cSld name="Slide 48">
-    <p:bg>
-      <p:bgPr>
-        <a:blipFill dpi="0" rotWithShape="1">
-          <a:blip r:embed="rId1">
-            <a:lum/>
-          </a:blip>
-          <a:srcRect/>
-          <a:stretch>
-            <a:fillRect/>
-          </a:stretch>
-        </a:blipFill>
-        <a:effectLst/>
-      </p:bgPr>
-    </p:bg>
-    <p:spTree>
-      <p:nvGrpSpPr>
-        <p:cNvPr id="1" name=""/>
-        <p:cNvGrpSpPr/>
-        <p:nvPr/>
-      </p:nvGrpSpPr>
-      <p:grpSpPr>
-        <a:xfrm>
-          <a:off x="0" y="0"/>
-          <a:ext cx="0" cy="0"/>
-          <a:chOff x="0" y="0"/>
-          <a:chExt cx="0" cy="0"/>
-        </a:xfrm>
-      </p:grpSpPr>
-    </p:spTree>
-  </p:cSld>
-  <p:clrMapOvr>
-    <a:masterClrMapping/>
-  </p:clrMapOvr>
-</p:sld>
-</file>
-
-<file path=ppt/slides/slide49.xml><?xml version="1.0" encoding="utf-8"?>
-<p:sld xmlns:a="http://schemas.openxmlformats.org/drawingml/2006/main" xmlns:r="http://schemas.openxmlformats.org/officeDocument/2006/relationships" xmlns:p="http://schemas.openxmlformats.org/presentationml/2006/main">
-  <p:cSld name="Slide 49">
-    <p:bg>
-      <p:bgPr>
-        <a:blipFill dpi="0" rotWithShape="1">
-          <a:blip r:embed="rId1">
-            <a:lum/>
-          </a:blip>
-          <a:srcRect/>
-          <a:stretch>
-            <a:fillRect/>
-          </a:stretch>
-        </a:blipFill>
-        <a:effectLst/>
-      </p:bgPr>
-    </p:bg>
-    <p:spTree>
-      <p:nvGrpSpPr>
-        <p:cNvPr id="1" name=""/>
-        <p:cNvGrpSpPr/>
-        <p:nvPr/>
-      </p:nvGrpSpPr>
-      <p:grpSpPr>
-        <a:xfrm>
-          <a:off x="0" y="0"/>
-          <a:ext cx="0" cy="0"/>
-          <a:chOff x="0" y="0"/>
-          <a:chExt cx="0" cy="0"/>
-        </a:xfrm>
-      </p:grpSpPr>
-    </p:spTree>
-  </p:cSld>
-  <p:clrMapOvr>
-    <a:masterClrMapping/>
-  </p:clrMapOvr>
-</p:sld>
-</file>
-
 <file path=ppt/slides/slide5.xml><?xml version="1.0" encoding="utf-8"?>
 <p:sld xmlns:a="http://schemas.openxmlformats.org/drawingml/2006/main" xmlns:r="http://schemas.openxmlformats.org/officeDocument/2006/relationships" xmlns:p="http://schemas.openxmlformats.org/presentationml/2006/main">
   <p:cSld name="Slide 5">
-    <p:bg>
-      <p:bgPr>
-        <a:blipFill dpi="0" rotWithShape="1">
-          <a:blip r:embed="rId1">
-            <a:lum/>
-          </a:blip>
-          <a:srcRect/>
-          <a:stretch>
-            <a:fillRect/>
-          </a:stretch>
-        </a:blipFill>
-        <a:effectLst/>
-      </p:bgPr>
-    </p:bg>
-    <p:spTree>
-      <p:nvGrpSpPr>
-        <p:cNvPr id="1" name=""/>
-        <p:cNvGrpSpPr/>
-        <p:nvPr/>
-      </p:nvGrpSpPr>
-      <p:grpSpPr>
-        <a:xfrm>
-          <a:off x="0" y="0"/>
-          <a:ext cx="0" cy="0"/>
-          <a:chOff x="0" y="0"/>
-          <a:chExt cx="0" cy="0"/>
-        </a:xfrm>
-      </p:grpSpPr>
-    </p:spTree>
-  </p:cSld>
-  <p:clrMapOvr>
-    <a:masterClrMapping/>
-  </p:clrMapOvr>
-</p:sld>
-</file>
-
-<file path=ppt/slides/slide50.xml><?xml version="1.0" encoding="utf-8"?>
-<p:sld xmlns:a="http://schemas.openxmlformats.org/drawingml/2006/main" xmlns:r="http://schemas.openxmlformats.org/officeDocument/2006/relationships" xmlns:p="http://schemas.openxmlformats.org/presentationml/2006/main">
-  <p:cSld name="Slide 50">
-    <p:bg>
-      <p:bgPr>
-        <a:blipFill dpi="0" rotWithShape="1">
-          <a:blip r:embed="rId1">
-            <a:lum/>
-          </a:blip>
-          <a:srcRect/>
-          <a:stretch>
-            <a:fillRect/>
-          </a:stretch>
-        </a:blipFill>
-        <a:effectLst/>
-      </p:bgPr>
-    </p:bg>
-    <p:spTree>
-      <p:nvGrpSpPr>
-        <p:cNvPr id="1" name=""/>
-        <p:cNvGrpSpPr/>
-        <p:nvPr/>
-      </p:nvGrpSpPr>
-      <p:grpSpPr>
-        <a:xfrm>
-          <a:off x="0" y="0"/>
-          <a:ext cx="0" cy="0"/>
-          <a:chOff x="0" y="0"/>
-          <a:chExt cx="0" cy="0"/>
-        </a:xfrm>
-      </p:grpSpPr>
-    </p:spTree>
-  </p:cSld>
-  <p:clrMapOvr>
-    <a:masterClrMapping/>
-  </p:clrMapOvr>
-</p:sld>
-</file>
-
-<file path=ppt/slides/slide51.xml><?xml version="1.0" encoding="utf-8"?>
-<p:sld xmlns:a="http://schemas.openxmlformats.org/drawingml/2006/main" xmlns:r="http://schemas.openxmlformats.org/officeDocument/2006/relationships" xmlns:p="http://schemas.openxmlformats.org/presentationml/2006/main">
-  <p:cSld name="Slide 51">
     <p:bg>
       <p:bgPr>
         <a:blipFill dpi="0" rotWithShape="1">

</xml_diff>